<commit_message>
new file:   borderland/2-urea/dataset/Backup/UREA - Backup.gdt
</commit_message>
<xml_diff>
--- a/borderland/2-urea/presentation/urea.pptx
+++ b/borderland/2-urea/presentation/urea.pptx
@@ -5,30 +5,39 @@
     <p:sldMasterId id="2147483648" r:id="rId1"/>
   </p:sldMasterIdLst>
   <p:notesMasterIdLst>
-    <p:notesMasterId r:id="rId23"/>
+    <p:notesMasterId r:id="rId32"/>
   </p:notesMasterIdLst>
   <p:sldIdLst>
     <p:sldId id="256" r:id="rId2"/>
-    <p:sldId id="257" r:id="rId3"/>
-    <p:sldId id="259" r:id="rId4"/>
-    <p:sldId id="260" r:id="rId5"/>
-    <p:sldId id="261" r:id="rId6"/>
-    <p:sldId id="262" r:id="rId7"/>
-    <p:sldId id="269" r:id="rId8"/>
-    <p:sldId id="275" r:id="rId9"/>
-    <p:sldId id="277" r:id="rId10"/>
-    <p:sldId id="276" r:id="rId11"/>
-    <p:sldId id="274" r:id="rId12"/>
-    <p:sldId id="263" r:id="rId13"/>
-    <p:sldId id="272" r:id="rId14"/>
-    <p:sldId id="267" r:id="rId15"/>
-    <p:sldId id="265" r:id="rId16"/>
-    <p:sldId id="273" r:id="rId17"/>
-    <p:sldId id="271" r:id="rId18"/>
-    <p:sldId id="264" r:id="rId19"/>
-    <p:sldId id="266" r:id="rId20"/>
-    <p:sldId id="268" r:id="rId21"/>
-    <p:sldId id="278" r:id="rId22"/>
+    <p:sldId id="280" r:id="rId3"/>
+    <p:sldId id="281" r:id="rId4"/>
+    <p:sldId id="257" r:id="rId5"/>
+    <p:sldId id="259" r:id="rId6"/>
+    <p:sldId id="260" r:id="rId7"/>
+    <p:sldId id="261" r:id="rId8"/>
+    <p:sldId id="262" r:id="rId9"/>
+    <p:sldId id="269" r:id="rId10"/>
+    <p:sldId id="282" r:id="rId11"/>
+    <p:sldId id="275" r:id="rId12"/>
+    <p:sldId id="277" r:id="rId13"/>
+    <p:sldId id="276" r:id="rId14"/>
+    <p:sldId id="274" r:id="rId15"/>
+    <p:sldId id="284" r:id="rId16"/>
+    <p:sldId id="267" r:id="rId17"/>
+    <p:sldId id="279" r:id="rId18"/>
+    <p:sldId id="283" r:id="rId19"/>
+    <p:sldId id="263" r:id="rId20"/>
+    <p:sldId id="265" r:id="rId21"/>
+    <p:sldId id="291" r:id="rId22"/>
+    <p:sldId id="292" r:id="rId23"/>
+    <p:sldId id="286" r:id="rId24"/>
+    <p:sldId id="273" r:id="rId25"/>
+    <p:sldId id="271" r:id="rId26"/>
+    <p:sldId id="264" r:id="rId27"/>
+    <p:sldId id="287" r:id="rId28"/>
+    <p:sldId id="266" r:id="rId29"/>
+    <p:sldId id="268" r:id="rId30"/>
+    <p:sldId id="278" r:id="rId31"/>
   </p:sldIdLst>
   <p:sldSz cx="12192000" cy="6858000"/>
   <p:notesSz cx="6858000" cy="9144000"/>
@@ -133,23 +142,32 @@
         <p14:section name="Default Section" id="{A084858A-5FC9-4FB8-9A70-32078733FC8E}">
           <p14:sldIdLst>
             <p14:sldId id="256"/>
+            <p14:sldId id="280"/>
+            <p14:sldId id="281"/>
             <p14:sldId id="257"/>
             <p14:sldId id="259"/>
             <p14:sldId id="260"/>
             <p14:sldId id="261"/>
             <p14:sldId id="262"/>
             <p14:sldId id="269"/>
+            <p14:sldId id="282"/>
             <p14:sldId id="275"/>
             <p14:sldId id="277"/>
             <p14:sldId id="276"/>
             <p14:sldId id="274"/>
+            <p14:sldId id="284"/>
+            <p14:sldId id="267"/>
+            <p14:sldId id="279"/>
+            <p14:sldId id="283"/>
             <p14:sldId id="263"/>
-            <p14:sldId id="272"/>
-            <p14:sldId id="267"/>
             <p14:sldId id="265"/>
+            <p14:sldId id="291"/>
+            <p14:sldId id="292"/>
+            <p14:sldId id="286"/>
             <p14:sldId id="273"/>
             <p14:sldId id="271"/>
             <p14:sldId id="264"/>
+            <p14:sldId id="287"/>
             <p14:sldId id="266"/>
             <p14:sldId id="268"/>
             <p14:sldId id="278"/>
@@ -246,7 +264,7 @@
           <a:p>
             <a:fld id="{E7E16278-58A7-493D-BC41-ED0D01DC0F3D}" type="datetimeFigureOut">
               <a:rPr lang="en-US" smtClean="0"/>
-              <a:t>9/26/2025</a:t>
+              <a:t>2025-09-26</a:t>
             </a:fld>
             <a:endParaRPr lang="en-US"/>
           </a:p>
@@ -578,7 +596,7 @@
           <a:p>
             <a:fld id="{39B0D423-1062-4D44-828B-BFEF85F303DF}" type="slidenum">
               <a:rPr lang="en-US" smtClean="0"/>
-              <a:t>14</a:t>
+              <a:t>16</a:t>
             </a:fld>
             <a:endParaRPr lang="en-US"/>
           </a:p>
@@ -588,6 +606,559 @@
     <p:extLst>
       <p:ext uri="{BB962C8B-B14F-4D97-AF65-F5344CB8AC3E}">
         <p14:creationId xmlns:p14="http://schemas.microsoft.com/office/powerpoint/2010/main" val="1598009394"/>
+      </p:ext>
+    </p:extLst>
+  </p:cSld>
+  <p:clrMapOvr>
+    <a:masterClrMapping/>
+  </p:clrMapOvr>
+</p:notes>
+</file>
+
+<file path=ppt/notesSlides/notesSlide2.xml><?xml version="1.0" encoding="utf-8"?>
+<p:notes xmlns:a="http://schemas.openxmlformats.org/drawingml/2006/main" xmlns:r="http://schemas.openxmlformats.org/officeDocument/2006/relationships" xmlns:p="http://schemas.openxmlformats.org/presentationml/2006/main">
+  <p:cSld>
+    <p:spTree>
+      <p:nvGrpSpPr>
+        <p:cNvPr id="1" name=""/>
+        <p:cNvGrpSpPr/>
+        <p:nvPr/>
+      </p:nvGrpSpPr>
+      <p:grpSpPr>
+        <a:xfrm>
+          <a:off x="0" y="0"/>
+          <a:ext cx="0" cy="0"/>
+          <a:chOff x="0" y="0"/>
+          <a:chExt cx="0" cy="0"/>
+        </a:xfrm>
+      </p:grpSpPr>
+      <p:sp>
+        <p:nvSpPr>
+          <p:cNvPr id="2" name="Slide Image Placeholder 1"/>
+          <p:cNvSpPr>
+            <a:spLocks noGrp="1" noRot="1" noChangeAspect="1"/>
+          </p:cNvSpPr>
+          <p:nvPr>
+            <p:ph type="sldImg"/>
+          </p:nvPr>
+        </p:nvSpPr>
+        <p:spPr/>
+      </p:sp>
+      <p:sp>
+        <p:nvSpPr>
+          <p:cNvPr id="3" name="Notes Placeholder 2"/>
+          <p:cNvSpPr>
+            <a:spLocks noGrp="1"/>
+          </p:cNvSpPr>
+          <p:nvPr>
+            <p:ph type="body" idx="1"/>
+          </p:nvPr>
+        </p:nvSpPr>
+        <p:spPr/>
+        <p:txBody>
+          <a:bodyPr/>
+          <a:lstStyle/>
+          <a:p>
+            <a:r>
+              <a:rPr lang="en-US" dirty="0"/>
+              <a:t>IPPI, CAGR = 2.2%</a:t>
+            </a:r>
+          </a:p>
+          <a:p>
+            <a:r>
+              <a:rPr lang="en-US" dirty="0"/>
+              <a:t>Urea Price Index, CAGR = 6.0%</a:t>
+            </a:r>
+          </a:p>
+        </p:txBody>
+      </p:sp>
+      <p:sp>
+        <p:nvSpPr>
+          <p:cNvPr id="4" name="Slide Number Placeholder 3"/>
+          <p:cNvSpPr>
+            <a:spLocks noGrp="1"/>
+          </p:cNvSpPr>
+          <p:nvPr>
+            <p:ph type="sldNum" sz="quarter" idx="5"/>
+          </p:nvPr>
+        </p:nvSpPr>
+        <p:spPr/>
+        <p:txBody>
+          <a:bodyPr/>
+          <a:lstStyle/>
+          <a:p>
+            <a:fld id="{39B0D423-1062-4D44-828B-BFEF85F303DF}" type="slidenum">
+              <a:rPr lang="en-US" smtClean="0"/>
+              <a:t>17</a:t>
+            </a:fld>
+            <a:endParaRPr lang="en-US"/>
+          </a:p>
+        </p:txBody>
+      </p:sp>
+    </p:spTree>
+    <p:extLst>
+      <p:ext uri="{BB962C8B-B14F-4D97-AF65-F5344CB8AC3E}">
+        <p14:creationId xmlns:p14="http://schemas.microsoft.com/office/powerpoint/2010/main" val="2591732345"/>
+      </p:ext>
+    </p:extLst>
+  </p:cSld>
+  <p:clrMapOvr>
+    <a:masterClrMapping/>
+  </p:clrMapOvr>
+</p:notes>
+</file>
+
+<file path=ppt/notesSlides/notesSlide3.xml><?xml version="1.0" encoding="utf-8"?>
+<p:notes xmlns:a="http://schemas.openxmlformats.org/drawingml/2006/main" xmlns:r="http://schemas.openxmlformats.org/officeDocument/2006/relationships" xmlns:p="http://schemas.openxmlformats.org/presentationml/2006/main">
+  <p:cSld>
+    <p:spTree>
+      <p:nvGrpSpPr>
+        <p:cNvPr id="1" name=""/>
+        <p:cNvGrpSpPr/>
+        <p:nvPr/>
+      </p:nvGrpSpPr>
+      <p:grpSpPr>
+        <a:xfrm>
+          <a:off x="0" y="0"/>
+          <a:ext cx="0" cy="0"/>
+          <a:chOff x="0" y="0"/>
+          <a:chExt cx="0" cy="0"/>
+        </a:xfrm>
+      </p:grpSpPr>
+      <p:sp>
+        <p:nvSpPr>
+          <p:cNvPr id="2" name="Slide Image Placeholder 1"/>
+          <p:cNvSpPr>
+            <a:spLocks noGrp="1" noRot="1" noChangeAspect="1"/>
+          </p:cNvSpPr>
+          <p:nvPr>
+            <p:ph type="sldImg"/>
+          </p:nvPr>
+        </p:nvSpPr>
+        <p:spPr/>
+      </p:sp>
+      <p:sp>
+        <p:nvSpPr>
+          <p:cNvPr id="3" name="Notes Placeholder 2"/>
+          <p:cNvSpPr>
+            <a:spLocks noGrp="1"/>
+          </p:cNvSpPr>
+          <p:nvPr>
+            <p:ph type="body" idx="1"/>
+          </p:nvPr>
+        </p:nvSpPr>
+        <p:spPr/>
+        <p:txBody>
+          <a:bodyPr/>
+          <a:lstStyle/>
+          <a:p>
+            <a:pPr marL="0" marR="0" lvl="0" indent="0" algn="l" defTabSz="914400" rtl="0" eaLnBrk="1" fontAlgn="auto" latinLnBrk="0" hangingPunct="1">
+              <a:lnSpc>
+                <a:spcPct val="100000"/>
+              </a:lnSpc>
+              <a:spcBef>
+                <a:spcPts val="0"/>
+              </a:spcBef>
+              <a:spcAft>
+                <a:spcPts val="0"/>
+              </a:spcAft>
+              <a:buClrTx/>
+              <a:buSzTx/>
+              <a:buFontTx/>
+              <a:buNone/>
+              <a:tabLst/>
+              <a:defRPr/>
+            </a:pPr>
+            <a:r>
+              <a:rPr lang="en-US" dirty="0"/>
+              <a:t>Sample: 2016-Present</a:t>
+            </a:r>
+          </a:p>
+          <a:p>
+            <a:pPr marL="0" marR="0" lvl="0" indent="0" algn="l" defTabSz="914400" rtl="0" eaLnBrk="1" fontAlgn="auto" latinLnBrk="0" hangingPunct="1">
+              <a:lnSpc>
+                <a:spcPct val="100000"/>
+              </a:lnSpc>
+              <a:spcBef>
+                <a:spcPts val="0"/>
+              </a:spcBef>
+              <a:spcAft>
+                <a:spcPts val="0"/>
+              </a:spcAft>
+              <a:buClrTx/>
+              <a:buSzTx/>
+              <a:buFontTx/>
+              <a:buNone/>
+              <a:tabLst/>
+              <a:defRPr/>
+            </a:pPr>
+            <a:endParaRPr lang="en-US" dirty="0"/>
+          </a:p>
+          <a:p>
+            <a:pPr marL="0" marR="0" lvl="0" indent="0" algn="l" defTabSz="914400" rtl="0" eaLnBrk="1" fontAlgn="auto" latinLnBrk="0" hangingPunct="1">
+              <a:lnSpc>
+                <a:spcPct val="100000"/>
+              </a:lnSpc>
+              <a:spcBef>
+                <a:spcPts val="0"/>
+              </a:spcBef>
+              <a:spcAft>
+                <a:spcPts val="0"/>
+              </a:spcAft>
+              <a:buClrTx/>
+              <a:buSzTx/>
+              <a:buFontTx/>
+              <a:buNone/>
+              <a:tabLst/>
+              <a:defRPr/>
+            </a:pPr>
+            <a:r>
+              <a:rPr lang="en-US" dirty="0"/>
+              <a:t>Last Price (2025-06): $1038</a:t>
+            </a:r>
+          </a:p>
+          <a:p>
+            <a:pPr marL="0" marR="0" lvl="0" indent="0" algn="l" defTabSz="914400" rtl="0" eaLnBrk="1" fontAlgn="auto" latinLnBrk="0" hangingPunct="1">
+              <a:lnSpc>
+                <a:spcPct val="100000"/>
+              </a:lnSpc>
+              <a:spcBef>
+                <a:spcPts val="0"/>
+              </a:spcBef>
+              <a:spcAft>
+                <a:spcPts val="0"/>
+              </a:spcAft>
+              <a:buClrTx/>
+              <a:buSzTx/>
+              <a:buFontTx/>
+              <a:buNone/>
+              <a:tabLst/>
+              <a:defRPr/>
+            </a:pPr>
+            <a:endParaRPr lang="en-US" dirty="0"/>
+          </a:p>
+          <a:p>
+            <a:pPr marL="0" marR="0" lvl="0" indent="0" algn="l" defTabSz="914400" rtl="0" eaLnBrk="1" fontAlgn="auto" latinLnBrk="0" hangingPunct="1">
+              <a:lnSpc>
+                <a:spcPct val="100000"/>
+              </a:lnSpc>
+              <a:spcBef>
+                <a:spcPts val="0"/>
+              </a:spcBef>
+              <a:spcAft>
+                <a:spcPts val="0"/>
+              </a:spcAft>
+              <a:buClrTx/>
+              <a:buSzTx/>
+              <a:buFontTx/>
+              <a:buNone/>
+              <a:tabLst/>
+              <a:defRPr/>
+            </a:pPr>
+            <a:r>
+              <a:rPr lang="en-US" dirty="0"/>
+              <a:t>2026:09                   1102.20      207.196       761.39 -  1443.01</a:t>
+            </a:r>
+          </a:p>
+          <a:p>
+            <a:endParaRPr lang="en-US" dirty="0"/>
+          </a:p>
+        </p:txBody>
+      </p:sp>
+      <p:sp>
+        <p:nvSpPr>
+          <p:cNvPr id="4" name="Slide Number Placeholder 3"/>
+          <p:cNvSpPr>
+            <a:spLocks noGrp="1"/>
+          </p:cNvSpPr>
+          <p:nvPr>
+            <p:ph type="sldNum" sz="quarter" idx="5"/>
+          </p:nvPr>
+        </p:nvSpPr>
+        <p:spPr/>
+        <p:txBody>
+          <a:bodyPr/>
+          <a:lstStyle/>
+          <a:p>
+            <a:fld id="{39B0D423-1062-4D44-828B-BFEF85F303DF}" type="slidenum">
+              <a:rPr lang="en-US" smtClean="0"/>
+              <a:t>19</a:t>
+            </a:fld>
+            <a:endParaRPr lang="en-US"/>
+          </a:p>
+        </p:txBody>
+      </p:sp>
+    </p:spTree>
+    <p:extLst>
+      <p:ext uri="{BB962C8B-B14F-4D97-AF65-F5344CB8AC3E}">
+        <p14:creationId xmlns:p14="http://schemas.microsoft.com/office/powerpoint/2010/main" val="2027378675"/>
+      </p:ext>
+    </p:extLst>
+  </p:cSld>
+  <p:clrMapOvr>
+    <a:masterClrMapping/>
+  </p:clrMapOvr>
+</p:notes>
+</file>
+
+<file path=ppt/notesSlides/notesSlide4.xml><?xml version="1.0" encoding="utf-8"?>
+<p:notes xmlns:a="http://schemas.openxmlformats.org/drawingml/2006/main" xmlns:r="http://schemas.openxmlformats.org/officeDocument/2006/relationships" xmlns:p="http://schemas.openxmlformats.org/presentationml/2006/main">
+  <p:cSld>
+    <p:spTree>
+      <p:nvGrpSpPr>
+        <p:cNvPr id="1" name="">
+          <a:extLst>
+            <a:ext uri="{FF2B5EF4-FFF2-40B4-BE49-F238E27FC236}">
+              <a16:creationId xmlns:a16="http://schemas.microsoft.com/office/drawing/2014/main" id="{E32E676C-5C04-DFA4-BE7A-D31DAE0EF427}"/>
+            </a:ext>
+          </a:extLst>
+        </p:cNvPr>
+        <p:cNvGrpSpPr/>
+        <p:nvPr/>
+      </p:nvGrpSpPr>
+      <p:grpSpPr>
+        <a:xfrm>
+          <a:off x="0" y="0"/>
+          <a:ext cx="0" cy="0"/>
+          <a:chOff x="0" y="0"/>
+          <a:chExt cx="0" cy="0"/>
+        </a:xfrm>
+      </p:grpSpPr>
+      <p:sp>
+        <p:nvSpPr>
+          <p:cNvPr id="2" name="Slide Image Placeholder 1">
+            <a:extLst>
+              <a:ext uri="{FF2B5EF4-FFF2-40B4-BE49-F238E27FC236}">
+                <a16:creationId xmlns:a16="http://schemas.microsoft.com/office/drawing/2014/main" id="{C96F7025-9571-C126-8599-027630045EE5}"/>
+              </a:ext>
+            </a:extLst>
+          </p:cNvPr>
+          <p:cNvSpPr>
+            <a:spLocks noGrp="1" noRot="1" noChangeAspect="1"/>
+          </p:cNvSpPr>
+          <p:nvPr>
+            <p:ph type="sldImg"/>
+          </p:nvPr>
+        </p:nvSpPr>
+        <p:spPr/>
+      </p:sp>
+      <p:sp>
+        <p:nvSpPr>
+          <p:cNvPr id="3" name="Notes Placeholder 2">
+            <a:extLst>
+              <a:ext uri="{FF2B5EF4-FFF2-40B4-BE49-F238E27FC236}">
+                <a16:creationId xmlns:a16="http://schemas.microsoft.com/office/drawing/2014/main" id="{99C59A14-5D8B-44FF-F9E0-DA80AA107A8D}"/>
+              </a:ext>
+            </a:extLst>
+          </p:cNvPr>
+          <p:cNvSpPr>
+            <a:spLocks noGrp="1"/>
+          </p:cNvSpPr>
+          <p:nvPr>
+            <p:ph type="body" idx="1"/>
+          </p:nvPr>
+        </p:nvSpPr>
+        <p:spPr/>
+        <p:txBody>
+          <a:bodyPr/>
+          <a:lstStyle/>
+          <a:p>
+            <a:r>
+              <a:rPr lang="en-US" dirty="0"/>
+              <a:t>Sample: 2016-PRESENT</a:t>
+            </a:r>
+          </a:p>
+          <a:p>
+            <a:r>
+              <a:rPr lang="en-US" dirty="0"/>
+              <a:t>Quantile Regression</a:t>
+            </a:r>
+          </a:p>
+          <a:p>
+            <a:r>
+              <a:rPr lang="en-US" dirty="0"/>
+              <a:t>Last Price (2025-06): 575 CAD</a:t>
+            </a:r>
+          </a:p>
+          <a:p>
+            <a:endParaRPr lang="en-US" dirty="0"/>
+          </a:p>
+          <a:p>
+            <a:r>
+              <a:rPr lang="en-US" dirty="0"/>
+              <a:t>2026:09                586.791829   101.607085   418.269100 - 755.314559</a:t>
+            </a:r>
+          </a:p>
+          <a:p>
+            <a:endParaRPr lang="en-US" dirty="0"/>
+          </a:p>
+        </p:txBody>
+      </p:sp>
+      <p:sp>
+        <p:nvSpPr>
+          <p:cNvPr id="4" name="Slide Number Placeholder 3">
+            <a:extLst>
+              <a:ext uri="{FF2B5EF4-FFF2-40B4-BE49-F238E27FC236}">
+                <a16:creationId xmlns:a16="http://schemas.microsoft.com/office/drawing/2014/main" id="{86AFB4AA-65EA-59E9-BE51-F445471E23A4}"/>
+              </a:ext>
+            </a:extLst>
+          </p:cNvPr>
+          <p:cNvSpPr>
+            <a:spLocks noGrp="1"/>
+          </p:cNvSpPr>
+          <p:nvPr>
+            <p:ph type="sldNum" sz="quarter" idx="5"/>
+          </p:nvPr>
+        </p:nvSpPr>
+        <p:spPr/>
+        <p:txBody>
+          <a:bodyPr/>
+          <a:lstStyle/>
+          <a:p>
+            <a:fld id="{39B0D423-1062-4D44-828B-BFEF85F303DF}" type="slidenum">
+              <a:rPr lang="en-US" smtClean="0"/>
+              <a:t>21</a:t>
+            </a:fld>
+            <a:endParaRPr lang="en-US"/>
+          </a:p>
+        </p:txBody>
+      </p:sp>
+    </p:spTree>
+    <p:extLst>
+      <p:ext uri="{BB962C8B-B14F-4D97-AF65-F5344CB8AC3E}">
+        <p14:creationId xmlns:p14="http://schemas.microsoft.com/office/powerpoint/2010/main" val="1755985022"/>
+      </p:ext>
+    </p:extLst>
+  </p:cSld>
+  <p:clrMapOvr>
+    <a:masterClrMapping/>
+  </p:clrMapOvr>
+</p:notes>
+</file>
+
+<file path=ppt/notesSlides/notesSlide5.xml><?xml version="1.0" encoding="utf-8"?>
+<p:notes xmlns:a="http://schemas.openxmlformats.org/drawingml/2006/main" xmlns:r="http://schemas.openxmlformats.org/officeDocument/2006/relationships" xmlns:p="http://schemas.openxmlformats.org/presentationml/2006/main">
+  <p:cSld>
+    <p:spTree>
+      <p:nvGrpSpPr>
+        <p:cNvPr id="1" name="">
+          <a:extLst>
+            <a:ext uri="{FF2B5EF4-FFF2-40B4-BE49-F238E27FC236}">
+              <a16:creationId xmlns:a16="http://schemas.microsoft.com/office/drawing/2014/main" id="{CC5D0A33-A3D6-29D0-57C7-48D1304E36A3}"/>
+            </a:ext>
+          </a:extLst>
+        </p:cNvPr>
+        <p:cNvGrpSpPr/>
+        <p:nvPr/>
+      </p:nvGrpSpPr>
+      <p:grpSpPr>
+        <a:xfrm>
+          <a:off x="0" y="0"/>
+          <a:ext cx="0" cy="0"/>
+          <a:chOff x="0" y="0"/>
+          <a:chExt cx="0" cy="0"/>
+        </a:xfrm>
+      </p:grpSpPr>
+      <p:sp>
+        <p:nvSpPr>
+          <p:cNvPr id="2" name="Slide Image Placeholder 1">
+            <a:extLst>
+              <a:ext uri="{FF2B5EF4-FFF2-40B4-BE49-F238E27FC236}">
+                <a16:creationId xmlns:a16="http://schemas.microsoft.com/office/drawing/2014/main" id="{54B3EEF3-9784-8DB1-90A6-8E8E3362A768}"/>
+              </a:ext>
+            </a:extLst>
+          </p:cNvPr>
+          <p:cNvSpPr>
+            <a:spLocks noGrp="1" noRot="1" noChangeAspect="1"/>
+          </p:cNvSpPr>
+          <p:nvPr>
+            <p:ph type="sldImg"/>
+          </p:nvPr>
+        </p:nvSpPr>
+        <p:spPr/>
+      </p:sp>
+      <p:sp>
+        <p:nvSpPr>
+          <p:cNvPr id="3" name="Notes Placeholder 2">
+            <a:extLst>
+              <a:ext uri="{FF2B5EF4-FFF2-40B4-BE49-F238E27FC236}">
+                <a16:creationId xmlns:a16="http://schemas.microsoft.com/office/drawing/2014/main" id="{6A1C94B4-CD7F-A406-5256-E2FB60700ADE}"/>
+              </a:ext>
+            </a:extLst>
+          </p:cNvPr>
+          <p:cNvSpPr>
+            <a:spLocks noGrp="1"/>
+          </p:cNvSpPr>
+          <p:nvPr>
+            <p:ph type="body" idx="1"/>
+          </p:nvPr>
+        </p:nvSpPr>
+        <p:spPr/>
+        <p:txBody>
+          <a:bodyPr/>
+          <a:lstStyle/>
+          <a:p>
+            <a:r>
+              <a:rPr lang="en-US" dirty="0"/>
+              <a:t>Sample: 2016-PRESENT</a:t>
+            </a:r>
+          </a:p>
+          <a:p>
+            <a:r>
+              <a:rPr lang="en-US" dirty="0"/>
+              <a:t>Quantile Regression</a:t>
+            </a:r>
+          </a:p>
+          <a:p>
+            <a:r>
+              <a:rPr lang="en-US" dirty="0"/>
+              <a:t>Last Price (2025-06): $1038</a:t>
+            </a:r>
+          </a:p>
+          <a:p>
+            <a:endParaRPr lang="en-US" dirty="0"/>
+          </a:p>
+          <a:p>
+            <a:r>
+              <a:rPr lang="en-US" dirty="0"/>
+              <a:t>2026:09                    872.70      109.441       691.19 -  1054.22</a:t>
+            </a:r>
+          </a:p>
+        </p:txBody>
+      </p:sp>
+      <p:sp>
+        <p:nvSpPr>
+          <p:cNvPr id="4" name="Slide Number Placeholder 3">
+            <a:extLst>
+              <a:ext uri="{FF2B5EF4-FFF2-40B4-BE49-F238E27FC236}">
+                <a16:creationId xmlns:a16="http://schemas.microsoft.com/office/drawing/2014/main" id="{DAF49B3D-BF48-E72B-B100-35ADD1BE0A4F}"/>
+              </a:ext>
+            </a:extLst>
+          </p:cNvPr>
+          <p:cNvSpPr>
+            <a:spLocks noGrp="1"/>
+          </p:cNvSpPr>
+          <p:nvPr>
+            <p:ph type="sldNum" sz="quarter" idx="5"/>
+          </p:nvPr>
+        </p:nvSpPr>
+        <p:spPr/>
+        <p:txBody>
+          <a:bodyPr/>
+          <a:lstStyle/>
+          <a:p>
+            <a:fld id="{39B0D423-1062-4D44-828B-BFEF85F303DF}" type="slidenum">
+              <a:rPr lang="en-US" smtClean="0"/>
+              <a:t>22</a:t>
+            </a:fld>
+            <a:endParaRPr lang="en-US"/>
+          </a:p>
+        </p:txBody>
+      </p:sp>
+    </p:spTree>
+    <p:extLst>
+      <p:ext uri="{BB962C8B-B14F-4D97-AF65-F5344CB8AC3E}">
+        <p14:creationId xmlns:p14="http://schemas.microsoft.com/office/powerpoint/2010/main" val="808214789"/>
       </p:ext>
     </p:extLst>
   </p:cSld>
@@ -744,7 +1315,7 @@
           <a:p>
             <a:fld id="{DAC4A3B0-DC28-4825-85A8-86BBA3F63BF6}" type="datetimeFigureOut">
               <a:rPr lang="en-US" smtClean="0"/>
-              <a:t>9/26/2025</a:t>
+              <a:t>2025-09-26</a:t>
             </a:fld>
             <a:endParaRPr lang="en-US"/>
           </a:p>
@@ -942,7 +1513,7 @@
           <a:p>
             <a:fld id="{DAC4A3B0-DC28-4825-85A8-86BBA3F63BF6}" type="datetimeFigureOut">
               <a:rPr lang="en-US" smtClean="0"/>
-              <a:t>9/26/2025</a:t>
+              <a:t>2025-09-26</a:t>
             </a:fld>
             <a:endParaRPr lang="en-US"/>
           </a:p>
@@ -1150,7 +1721,7 @@
           <a:p>
             <a:fld id="{DAC4A3B0-DC28-4825-85A8-86BBA3F63BF6}" type="datetimeFigureOut">
               <a:rPr lang="en-US" smtClean="0"/>
-              <a:t>9/26/2025</a:t>
+              <a:t>2025-09-26</a:t>
             </a:fld>
             <a:endParaRPr lang="en-US"/>
           </a:p>
@@ -1348,7 +1919,7 @@
           <a:p>
             <a:fld id="{DAC4A3B0-DC28-4825-85A8-86BBA3F63BF6}" type="datetimeFigureOut">
               <a:rPr lang="en-US" smtClean="0"/>
-              <a:t>9/26/2025</a:t>
+              <a:t>2025-09-26</a:t>
             </a:fld>
             <a:endParaRPr lang="en-US"/>
           </a:p>
@@ -1623,7 +2194,7 @@
           <a:p>
             <a:fld id="{DAC4A3B0-DC28-4825-85A8-86BBA3F63BF6}" type="datetimeFigureOut">
               <a:rPr lang="en-US" smtClean="0"/>
-              <a:t>9/26/2025</a:t>
+              <a:t>2025-09-26</a:t>
             </a:fld>
             <a:endParaRPr lang="en-US"/>
           </a:p>
@@ -1888,7 +2459,7 @@
           <a:p>
             <a:fld id="{DAC4A3B0-DC28-4825-85A8-86BBA3F63BF6}" type="datetimeFigureOut">
               <a:rPr lang="en-US" smtClean="0"/>
-              <a:t>9/26/2025</a:t>
+              <a:t>2025-09-26</a:t>
             </a:fld>
             <a:endParaRPr lang="en-US"/>
           </a:p>
@@ -2300,7 +2871,7 @@
           <a:p>
             <a:fld id="{DAC4A3B0-DC28-4825-85A8-86BBA3F63BF6}" type="datetimeFigureOut">
               <a:rPr lang="en-US" smtClean="0"/>
-              <a:t>9/26/2025</a:t>
+              <a:t>2025-09-26</a:t>
             </a:fld>
             <a:endParaRPr lang="en-US"/>
           </a:p>
@@ -2441,7 +3012,7 @@
           <a:p>
             <a:fld id="{DAC4A3B0-DC28-4825-85A8-86BBA3F63BF6}" type="datetimeFigureOut">
               <a:rPr lang="en-US" smtClean="0"/>
-              <a:t>9/26/2025</a:t>
+              <a:t>2025-09-26</a:t>
             </a:fld>
             <a:endParaRPr lang="en-US"/>
           </a:p>
@@ -2554,7 +3125,7 @@
           <a:p>
             <a:fld id="{DAC4A3B0-DC28-4825-85A8-86BBA3F63BF6}" type="datetimeFigureOut">
               <a:rPr lang="en-US" smtClean="0"/>
-              <a:t>9/26/2025</a:t>
+              <a:t>2025-09-26</a:t>
             </a:fld>
             <a:endParaRPr lang="en-US"/>
           </a:p>
@@ -2865,7 +3436,7 @@
           <a:p>
             <a:fld id="{DAC4A3B0-DC28-4825-85A8-86BBA3F63BF6}" type="datetimeFigureOut">
               <a:rPr lang="en-US" smtClean="0"/>
-              <a:t>9/26/2025</a:t>
+              <a:t>2025-09-26</a:t>
             </a:fld>
             <a:endParaRPr lang="en-US"/>
           </a:p>
@@ -3153,7 +3724,7 @@
           <a:p>
             <a:fld id="{DAC4A3B0-DC28-4825-85A8-86BBA3F63BF6}" type="datetimeFigureOut">
               <a:rPr lang="en-US" smtClean="0"/>
-              <a:t>9/26/2025</a:t>
+              <a:t>2025-09-26</a:t>
             </a:fld>
             <a:endParaRPr lang="en-US"/>
           </a:p>
@@ -3394,7 +3965,7 @@
           <a:p>
             <a:fld id="{DAC4A3B0-DC28-4825-85A8-86BBA3F63BF6}" type="datetimeFigureOut">
               <a:rPr lang="en-US" smtClean="0"/>
-              <a:t>9/26/2025</a:t>
+              <a:t>2025-09-26</a:t>
             </a:fld>
             <a:endParaRPr lang="en-US"/>
           </a:p>
@@ -3868,13 +4439,8 @@
           <a:p>
             <a:r>
               <a:rPr lang="en-US" dirty="0"/>
-              <a:t>Mahdi </a:t>
-            </a:r>
-            <a:r>
-              <a:rPr lang="en-US" dirty="0" err="1"/>
-              <a:t>Ghafarian</a:t>
-            </a:r>
-            <a:endParaRPr lang="en-US" dirty="0"/>
+              <a:t>Mahdi Ghafarian</a:t>
+            </a:r>
           </a:p>
           <a:p>
             <a:r>
@@ -3919,6 +4485,269 @@
       </p:grpSpPr>
       <p:sp>
         <p:nvSpPr>
+          <p:cNvPr id="5" name="Title 4">
+            <a:extLst>
+              <a:ext uri="{FF2B5EF4-FFF2-40B4-BE49-F238E27FC236}">
+                <a16:creationId xmlns:a16="http://schemas.microsoft.com/office/drawing/2014/main" id="{5FEBF6CD-FF15-BA13-A5BA-A017711B474E}"/>
+              </a:ext>
+            </a:extLst>
+          </p:cNvPr>
+          <p:cNvSpPr>
+            <a:spLocks noGrp="1"/>
+          </p:cNvSpPr>
+          <p:nvPr>
+            <p:ph type="title"/>
+          </p:nvPr>
+        </p:nvSpPr>
+        <p:spPr/>
+        <p:txBody>
+          <a:bodyPr/>
+          <a:lstStyle/>
+          <a:p>
+            <a:r>
+              <a:rPr lang="en-US" dirty="0"/>
+              <a:t>2. Urea Price Drivers</a:t>
+            </a:r>
+          </a:p>
+        </p:txBody>
+      </p:sp>
+      <p:sp>
+        <p:nvSpPr>
+          <p:cNvPr id="6" name="Text Placeholder 5">
+            <a:extLst>
+              <a:ext uri="{FF2B5EF4-FFF2-40B4-BE49-F238E27FC236}">
+                <a16:creationId xmlns:a16="http://schemas.microsoft.com/office/drawing/2014/main" id="{3050C602-1300-82A2-0907-9DD310A77494}"/>
+              </a:ext>
+            </a:extLst>
+          </p:cNvPr>
+          <p:cNvSpPr>
+            <a:spLocks noGrp="1"/>
+          </p:cNvSpPr>
+          <p:nvPr>
+            <p:ph type="body" idx="1"/>
+          </p:nvPr>
+        </p:nvSpPr>
+        <p:spPr/>
+        <p:txBody>
+          <a:bodyPr/>
+          <a:lstStyle/>
+          <a:p>
+            <a:endParaRPr lang="en-US"/>
+          </a:p>
+        </p:txBody>
+      </p:sp>
+    </p:spTree>
+    <p:extLst>
+      <p:ext uri="{BB962C8B-B14F-4D97-AF65-F5344CB8AC3E}">
+        <p14:creationId xmlns:p14="http://schemas.microsoft.com/office/powerpoint/2010/main" val="428157702"/>
+      </p:ext>
+    </p:extLst>
+  </p:cSld>
+  <p:clrMapOvr>
+    <a:masterClrMapping/>
+  </p:clrMapOvr>
+</p:sld>
+</file>
+
+<file path=ppt/slides/slide11.xml><?xml version="1.0" encoding="utf-8"?>
+<p:sld xmlns:a="http://schemas.openxmlformats.org/drawingml/2006/main" xmlns:r="http://schemas.openxmlformats.org/officeDocument/2006/relationships" xmlns:p="http://schemas.openxmlformats.org/presentationml/2006/main">
+  <p:cSld>
+    <p:spTree>
+      <p:nvGrpSpPr>
+        <p:cNvPr id="1" name=""/>
+        <p:cNvGrpSpPr/>
+        <p:nvPr/>
+      </p:nvGrpSpPr>
+      <p:grpSpPr>
+        <a:xfrm>
+          <a:off x="0" y="0"/>
+          <a:ext cx="0" cy="0"/>
+          <a:chOff x="0" y="0"/>
+          <a:chExt cx="0" cy="0"/>
+        </a:xfrm>
+      </p:grpSpPr>
+      <p:sp>
+        <p:nvSpPr>
+          <p:cNvPr id="2" name="Title 1">
+            <a:extLst>
+              <a:ext uri="{FF2B5EF4-FFF2-40B4-BE49-F238E27FC236}">
+                <a16:creationId xmlns:a16="http://schemas.microsoft.com/office/drawing/2014/main" id="{B2E830F0-B6D0-2FF7-78B7-50BF75D1D3ED}"/>
+              </a:ext>
+            </a:extLst>
+          </p:cNvPr>
+          <p:cNvSpPr>
+            <a:spLocks noGrp="1"/>
+          </p:cNvSpPr>
+          <p:nvPr>
+            <p:ph type="title"/>
+          </p:nvPr>
+        </p:nvSpPr>
+        <p:spPr/>
+        <p:txBody>
+          <a:bodyPr/>
+          <a:lstStyle/>
+          <a:p>
+            <a:r>
+              <a:rPr lang="en-US" dirty="0"/>
+              <a:t>Corn is trading at 2010 levels ($400) and is undervalued</a:t>
+            </a:r>
+          </a:p>
+        </p:txBody>
+      </p:sp>
+      <p:pic>
+        <p:nvPicPr>
+          <p:cNvPr id="5" name="Content Placeholder 4">
+            <a:extLst>
+              <a:ext uri="{FF2B5EF4-FFF2-40B4-BE49-F238E27FC236}">
+                <a16:creationId xmlns:a16="http://schemas.microsoft.com/office/drawing/2014/main" id="{AEA6959C-C966-946D-31B9-5DC6E74DB857}"/>
+              </a:ext>
+            </a:extLst>
+          </p:cNvPr>
+          <p:cNvPicPr>
+            <a:picLocks noGrp="1" noChangeAspect="1"/>
+          </p:cNvPicPr>
+          <p:nvPr>
+            <p:ph idx="1"/>
+          </p:nvPr>
+        </p:nvPicPr>
+        <p:blipFill>
+          <a:blip r:embed="rId2"/>
+          <a:stretch>
+            <a:fillRect/>
+          </a:stretch>
+        </p:blipFill>
+        <p:spPr>
+          <a:xfrm>
+            <a:off x="2384333" y="1825625"/>
+            <a:ext cx="7423334" cy="4351338"/>
+          </a:xfrm>
+          <a:prstGeom prst="rect">
+            <a:avLst/>
+          </a:prstGeom>
+        </p:spPr>
+      </p:pic>
+    </p:spTree>
+    <p:extLst>
+      <p:ext uri="{BB962C8B-B14F-4D97-AF65-F5344CB8AC3E}">
+        <p14:creationId xmlns:p14="http://schemas.microsoft.com/office/powerpoint/2010/main" val="2820620688"/>
+      </p:ext>
+    </p:extLst>
+  </p:cSld>
+  <p:clrMapOvr>
+    <a:masterClrMapping/>
+  </p:clrMapOvr>
+</p:sld>
+</file>
+
+<file path=ppt/slides/slide12.xml><?xml version="1.0" encoding="utf-8"?>
+<p:sld xmlns:a="http://schemas.openxmlformats.org/drawingml/2006/main" xmlns:r="http://schemas.openxmlformats.org/officeDocument/2006/relationships" xmlns:p="http://schemas.openxmlformats.org/presentationml/2006/main">
+  <p:cSld>
+    <p:spTree>
+      <p:nvGrpSpPr>
+        <p:cNvPr id="1" name=""/>
+        <p:cNvGrpSpPr/>
+        <p:nvPr/>
+      </p:nvGrpSpPr>
+      <p:grpSpPr>
+        <a:xfrm>
+          <a:off x="0" y="0"/>
+          <a:ext cx="0" cy="0"/>
+          <a:chOff x="0" y="0"/>
+          <a:chExt cx="0" cy="0"/>
+        </a:xfrm>
+      </p:grpSpPr>
+      <p:sp>
+        <p:nvSpPr>
+          <p:cNvPr id="2" name="Title 1">
+            <a:extLst>
+              <a:ext uri="{FF2B5EF4-FFF2-40B4-BE49-F238E27FC236}">
+                <a16:creationId xmlns:a16="http://schemas.microsoft.com/office/drawing/2014/main" id="{AF98EA6E-BA16-09A3-7211-A03632216E8C}"/>
+              </a:ext>
+            </a:extLst>
+          </p:cNvPr>
+          <p:cNvSpPr>
+            <a:spLocks noGrp="1"/>
+          </p:cNvSpPr>
+          <p:nvPr>
+            <p:ph type="title"/>
+          </p:nvPr>
+        </p:nvSpPr>
+        <p:spPr/>
+        <p:txBody>
+          <a:bodyPr/>
+          <a:lstStyle/>
+          <a:p>
+            <a:r>
+              <a:rPr lang="en-US" dirty="0"/>
+              <a:t>Corn price is below CPI Food Index (Annual Growth Rate = 3%)</a:t>
+            </a:r>
+          </a:p>
+        </p:txBody>
+      </p:sp>
+      <p:pic>
+        <p:nvPicPr>
+          <p:cNvPr id="5" name="Content Placeholder 4">
+            <a:extLst>
+              <a:ext uri="{FF2B5EF4-FFF2-40B4-BE49-F238E27FC236}">
+                <a16:creationId xmlns:a16="http://schemas.microsoft.com/office/drawing/2014/main" id="{1D91138E-829A-BF2B-E202-36CFB18A9973}"/>
+              </a:ext>
+            </a:extLst>
+          </p:cNvPr>
+          <p:cNvPicPr>
+            <a:picLocks noGrp="1" noChangeAspect="1"/>
+          </p:cNvPicPr>
+          <p:nvPr>
+            <p:ph idx="1"/>
+          </p:nvPr>
+        </p:nvPicPr>
+        <p:blipFill>
+          <a:blip r:embed="rId2"/>
+          <a:stretch>
+            <a:fillRect/>
+          </a:stretch>
+        </p:blipFill>
+        <p:spPr>
+          <a:xfrm>
+            <a:off x="2398939" y="1825625"/>
+            <a:ext cx="7394121" cy="4351338"/>
+          </a:xfrm>
+          <a:prstGeom prst="rect">
+            <a:avLst/>
+          </a:prstGeom>
+        </p:spPr>
+      </p:pic>
+    </p:spTree>
+    <p:extLst>
+      <p:ext uri="{BB962C8B-B14F-4D97-AF65-F5344CB8AC3E}">
+        <p14:creationId xmlns:p14="http://schemas.microsoft.com/office/powerpoint/2010/main" val="221586455"/>
+      </p:ext>
+    </p:extLst>
+  </p:cSld>
+  <p:clrMapOvr>
+    <a:masterClrMapping/>
+  </p:clrMapOvr>
+</p:sld>
+</file>
+
+<file path=ppt/slides/slide13.xml><?xml version="1.0" encoding="utf-8"?>
+<p:sld xmlns:a="http://schemas.openxmlformats.org/drawingml/2006/main" xmlns:r="http://schemas.openxmlformats.org/officeDocument/2006/relationships" xmlns:p="http://schemas.openxmlformats.org/presentationml/2006/main">
+  <p:cSld>
+    <p:spTree>
+      <p:nvGrpSpPr>
+        <p:cNvPr id="1" name=""/>
+        <p:cNvGrpSpPr/>
+        <p:nvPr/>
+      </p:nvGrpSpPr>
+      <p:grpSpPr>
+        <a:xfrm>
+          <a:off x="0" y="0"/>
+          <a:ext cx="0" cy="0"/>
+          <a:chOff x="0" y="0"/>
+          <a:chExt cx="0" cy="0"/>
+        </a:xfrm>
+      </p:grpSpPr>
+      <p:sp>
+        <p:nvSpPr>
           <p:cNvPr id="2" name="Title 1">
             <a:extLst>
               <a:ext uri="{FF2B5EF4-FFF2-40B4-BE49-F238E27FC236}">
@@ -3990,7 +4819,7 @@
 </p:sld>
 </file>
 
-<file path=ppt/slides/slide11.xml><?xml version="1.0" encoding="utf-8"?>
+<file path=ppt/slides/slide14.xml><?xml version="1.0" encoding="utf-8"?>
 <p:sld xmlns:a="http://schemas.openxmlformats.org/drawingml/2006/main" xmlns:r="http://schemas.openxmlformats.org/officeDocument/2006/relationships" xmlns:p="http://schemas.openxmlformats.org/presentationml/2006/main">
   <p:cSld>
     <p:spTree>
@@ -4080,7 +4909,7 @@
 </p:sld>
 </file>
 
-<file path=ppt/slides/slide12.xml><?xml version="1.0" encoding="utf-8"?>
+<file path=ppt/slides/slide15.xml><?xml version="1.0" encoding="utf-8"?>
 <p:sld xmlns:a="http://schemas.openxmlformats.org/drawingml/2006/main" xmlns:r="http://schemas.openxmlformats.org/officeDocument/2006/relationships" xmlns:p="http://schemas.openxmlformats.org/presentationml/2006/main">
   <p:cSld>
     <p:spTree>
@@ -4102,7 +4931,7 @@
           <p:cNvPr id="2" name="Title 1">
             <a:extLst>
               <a:ext uri="{FF2B5EF4-FFF2-40B4-BE49-F238E27FC236}">
-                <a16:creationId xmlns:a16="http://schemas.microsoft.com/office/drawing/2014/main" id="{1E5A455A-9346-5413-C4F1-93270BDC5DE6}"/>
+                <a16:creationId xmlns:a16="http://schemas.microsoft.com/office/drawing/2014/main" id="{21A91A73-49DD-B2F6-14FD-AE65C59C6943}"/>
               </a:ext>
             </a:extLst>
           </p:cNvPr>
@@ -4120,47 +4949,40 @@
           <a:p>
             <a:r>
               <a:rPr lang="en-US" dirty="0"/>
-              <a:t>Random Walk Model – Scenario Panning</a:t>
-            </a:r>
-          </a:p>
-        </p:txBody>
-      </p:sp>
-      <p:pic>
-        <p:nvPicPr>
-          <p:cNvPr id="9" name="Content Placeholder 8">
-            <a:extLst>
-              <a:ext uri="{FF2B5EF4-FFF2-40B4-BE49-F238E27FC236}">
-                <a16:creationId xmlns:a16="http://schemas.microsoft.com/office/drawing/2014/main" id="{8E974E19-ED14-F1DB-4861-0EF3F2820605}"/>
-              </a:ext>
-            </a:extLst>
-          </p:cNvPr>
-          <p:cNvPicPr>
-            <a:picLocks noGrp="1" noChangeAspect="1"/>
-          </p:cNvPicPr>
-          <p:nvPr>
-            <p:ph idx="1"/>
-          </p:nvPr>
-        </p:nvPicPr>
-        <p:blipFill>
-          <a:blip r:embed="rId2"/>
-          <a:stretch>
-            <a:fillRect/>
-          </a:stretch>
-        </p:blipFill>
-        <p:spPr>
-          <a:xfrm>
-            <a:off x="2438693" y="1825625"/>
-            <a:ext cx="7314614" cy="4351338"/>
-          </a:xfrm>
-          <a:prstGeom prst="rect">
-            <a:avLst/>
-          </a:prstGeom>
-        </p:spPr>
-      </p:pic>
+              <a:t>3. Urea Long-Term Trend</a:t>
+            </a:r>
+          </a:p>
+        </p:txBody>
+      </p:sp>
+      <p:sp>
+        <p:nvSpPr>
+          <p:cNvPr id="4" name="Text Placeholder 3">
+            <a:extLst>
+              <a:ext uri="{FF2B5EF4-FFF2-40B4-BE49-F238E27FC236}">
+                <a16:creationId xmlns:a16="http://schemas.microsoft.com/office/drawing/2014/main" id="{ADF9A087-060A-6918-0E96-3656E6E38267}"/>
+              </a:ext>
+            </a:extLst>
+          </p:cNvPr>
+          <p:cNvSpPr>
+            <a:spLocks noGrp="1"/>
+          </p:cNvSpPr>
+          <p:nvPr>
+            <p:ph type="body" idx="1"/>
+          </p:nvPr>
+        </p:nvSpPr>
+        <p:spPr/>
+        <p:txBody>
+          <a:bodyPr/>
+          <a:lstStyle/>
+          <a:p>
+            <a:endParaRPr lang="en-US" dirty="0"/>
+          </a:p>
+        </p:txBody>
+      </p:sp>
     </p:spTree>
     <p:extLst>
       <p:ext uri="{BB962C8B-B14F-4D97-AF65-F5344CB8AC3E}">
-        <p14:creationId xmlns:p14="http://schemas.microsoft.com/office/powerpoint/2010/main" val="999642252"/>
+        <p14:creationId xmlns:p14="http://schemas.microsoft.com/office/powerpoint/2010/main" val="3087458595"/>
       </p:ext>
     </p:extLst>
   </p:cSld>
@@ -4170,364 +4992,7 @@
 </p:sld>
 </file>
 
-<file path=ppt/slides/slide13.xml><?xml version="1.0" encoding="utf-8"?>
-<p:sld xmlns:a="http://schemas.openxmlformats.org/drawingml/2006/main" xmlns:r="http://schemas.openxmlformats.org/officeDocument/2006/relationships" xmlns:p="http://schemas.openxmlformats.org/presentationml/2006/main">
-  <p:cSld>
-    <p:spTree>
-      <p:nvGrpSpPr>
-        <p:cNvPr id="1" name="">
-          <a:extLst>
-            <a:ext uri="{FF2B5EF4-FFF2-40B4-BE49-F238E27FC236}">
-              <a16:creationId xmlns:a16="http://schemas.microsoft.com/office/drawing/2014/main" id="{B61A4BFE-C263-EFC8-1EB3-5516BD6EDAB4}"/>
-            </a:ext>
-          </a:extLst>
-        </p:cNvPr>
-        <p:cNvGrpSpPr/>
-        <p:nvPr/>
-      </p:nvGrpSpPr>
-      <p:grpSpPr>
-        <a:xfrm>
-          <a:off x="0" y="0"/>
-          <a:ext cx="0" cy="0"/>
-          <a:chOff x="0" y="0"/>
-          <a:chExt cx="0" cy="0"/>
-        </a:xfrm>
-      </p:grpSpPr>
-      <p:sp>
-        <p:nvSpPr>
-          <p:cNvPr id="2" name="Title 1">
-            <a:extLst>
-              <a:ext uri="{FF2B5EF4-FFF2-40B4-BE49-F238E27FC236}">
-                <a16:creationId xmlns:a16="http://schemas.microsoft.com/office/drawing/2014/main" id="{BDEB4D8B-6FE6-B82D-0469-B1EB1A08E872}"/>
-              </a:ext>
-            </a:extLst>
-          </p:cNvPr>
-          <p:cNvSpPr>
-            <a:spLocks noGrp="1"/>
-          </p:cNvSpPr>
-          <p:nvPr>
-            <p:ph type="title"/>
-          </p:nvPr>
-        </p:nvSpPr>
-        <p:spPr/>
-        <p:txBody>
-          <a:bodyPr/>
-          <a:lstStyle/>
-          <a:p>
-            <a:r>
-              <a:rPr lang="en-US" dirty="0"/>
-              <a:t>Random Walk Model – Scenario Panning</a:t>
-            </a:r>
-          </a:p>
-        </p:txBody>
-      </p:sp>
-      <p:sp>
-        <p:nvSpPr>
-          <p:cNvPr id="4" name="Content Placeholder 3">
-            <a:extLst>
-              <a:ext uri="{FF2B5EF4-FFF2-40B4-BE49-F238E27FC236}">
-                <a16:creationId xmlns:a16="http://schemas.microsoft.com/office/drawing/2014/main" id="{D57CA234-A565-53B9-042B-F4A3A92F0089}"/>
-              </a:ext>
-            </a:extLst>
-          </p:cNvPr>
-          <p:cNvSpPr>
-            <a:spLocks noGrp="1"/>
-          </p:cNvSpPr>
-          <p:nvPr>
-            <p:ph idx="1"/>
-          </p:nvPr>
-        </p:nvSpPr>
-        <p:spPr>
-          <a:xfrm>
-            <a:off x="838200" y="1825625"/>
-            <a:ext cx="10515600" cy="741680"/>
-          </a:xfrm>
-        </p:spPr>
-        <p:txBody>
-          <a:bodyPr/>
-          <a:lstStyle/>
-          <a:p>
-            <a:pPr marL="0" indent="0">
-              <a:buNone/>
-            </a:pPr>
-            <a:r>
-              <a:rPr lang="en-US" dirty="0"/>
-              <a:t>Forecast for Sep 2025, 90% Prediction Interval</a:t>
-            </a:r>
-          </a:p>
-          <a:p>
-            <a:endParaRPr lang="en-US" dirty="0"/>
-          </a:p>
-          <a:p>
-            <a:endParaRPr lang="en-US" dirty="0"/>
-          </a:p>
-          <a:p>
-            <a:endParaRPr lang="en-US" dirty="0"/>
-          </a:p>
-        </p:txBody>
-      </p:sp>
-      <p:graphicFrame>
-        <p:nvGraphicFramePr>
-          <p:cNvPr id="7" name="Table 6">
-            <a:extLst>
-              <a:ext uri="{FF2B5EF4-FFF2-40B4-BE49-F238E27FC236}">
-                <a16:creationId xmlns:a16="http://schemas.microsoft.com/office/drawing/2014/main" id="{ED53EAA4-13F5-81D1-9159-79EEE15190D1}"/>
-              </a:ext>
-            </a:extLst>
-          </p:cNvPr>
-          <p:cNvGraphicFramePr>
-            <a:graphicFrameLocks noGrp="1"/>
-          </p:cNvGraphicFramePr>
-          <p:nvPr>
-            <p:extLst>
-              <p:ext uri="{D42A27DB-BD31-4B8C-83A1-F6EECF244321}">
-                <p14:modId xmlns:p14="http://schemas.microsoft.com/office/powerpoint/2010/main" val="2020132177"/>
-              </p:ext>
-            </p:extLst>
-          </p:nvPr>
-        </p:nvGraphicFramePr>
-        <p:xfrm>
-          <a:off x="1825049" y="2923540"/>
-          <a:ext cx="8541901" cy="1010920"/>
-        </p:xfrm>
-        <a:graphic>
-          <a:graphicData uri="http://schemas.openxmlformats.org/drawingml/2006/table">
-            <a:tbl>
-              <a:tblPr firstRow="1" bandRow="1">
-                <a:tableStyleId>{5C22544A-7EE6-4342-B048-85BDC9FD1C3A}</a:tableStyleId>
-              </a:tblPr>
-              <a:tblGrid>
-                <a:gridCol w="1423650">
-                  <a:extLst>
-                    <a:ext uri="{9D8B030D-6E8A-4147-A177-3AD203B41FA5}">
-                      <a16:colId xmlns:a16="http://schemas.microsoft.com/office/drawing/2014/main" val="4155257274"/>
-                    </a:ext>
-                  </a:extLst>
-                </a:gridCol>
-                <a:gridCol w="1423650">
-                  <a:extLst>
-                    <a:ext uri="{9D8B030D-6E8A-4147-A177-3AD203B41FA5}">
-                      <a16:colId xmlns:a16="http://schemas.microsoft.com/office/drawing/2014/main" val="1784173928"/>
-                    </a:ext>
-                  </a:extLst>
-                </a:gridCol>
-                <a:gridCol w="1423650">
-                  <a:extLst>
-                    <a:ext uri="{9D8B030D-6E8A-4147-A177-3AD203B41FA5}">
-                      <a16:colId xmlns:a16="http://schemas.microsoft.com/office/drawing/2014/main" val="1622761043"/>
-                    </a:ext>
-                  </a:extLst>
-                </a:gridCol>
-                <a:gridCol w="1423650">
-                  <a:extLst>
-                    <a:ext uri="{9D8B030D-6E8A-4147-A177-3AD203B41FA5}">
-                      <a16:colId xmlns:a16="http://schemas.microsoft.com/office/drawing/2014/main" val="990677731"/>
-                    </a:ext>
-                  </a:extLst>
-                </a:gridCol>
-                <a:gridCol w="1406142">
-                  <a:extLst>
-                    <a:ext uri="{9D8B030D-6E8A-4147-A177-3AD203B41FA5}">
-                      <a16:colId xmlns:a16="http://schemas.microsoft.com/office/drawing/2014/main" val="2366238779"/>
-                    </a:ext>
-                  </a:extLst>
-                </a:gridCol>
-                <a:gridCol w="1441159">
-                  <a:extLst>
-                    <a:ext uri="{9D8B030D-6E8A-4147-A177-3AD203B41FA5}">
-                      <a16:colId xmlns:a16="http://schemas.microsoft.com/office/drawing/2014/main" val="1588838347"/>
-                    </a:ext>
-                  </a:extLst>
-                </a:gridCol>
-              </a:tblGrid>
-              <a:tr h="370840">
-                <a:tc>
-                  <a:txBody>
-                    <a:bodyPr/>
-                    <a:lstStyle/>
-                    <a:p>
-                      <a:r>
-                        <a:rPr lang="en-US" dirty="0"/>
-                        <a:t>Price</a:t>
-                      </a:r>
-                    </a:p>
-                  </a:txBody>
-                  <a:tcPr/>
-                </a:tc>
-                <a:tc>
-                  <a:txBody>
-                    <a:bodyPr/>
-                    <a:lstStyle/>
-                    <a:p>
-                      <a:r>
-                        <a:rPr lang="en-US" dirty="0"/>
-                        <a:t>Std Error</a:t>
-                      </a:r>
-                    </a:p>
-                  </a:txBody>
-                  <a:tcPr/>
-                </a:tc>
-                <a:tc>
-                  <a:txBody>
-                    <a:bodyPr/>
-                    <a:lstStyle/>
-                    <a:p>
-                      <a:r>
-                        <a:rPr lang="en-US" dirty="0"/>
-                        <a:t>Upper Band (95%)</a:t>
-                      </a:r>
-                    </a:p>
-                  </a:txBody>
-                  <a:tcPr/>
-                </a:tc>
-                <a:tc>
-                  <a:txBody>
-                    <a:bodyPr/>
-                    <a:lstStyle/>
-                    <a:p>
-                      <a:r>
-                        <a:rPr lang="en-US" dirty="0"/>
-                        <a:t>Lower Band (5%)</a:t>
-                      </a:r>
-                    </a:p>
-                  </a:txBody>
-                  <a:tcPr/>
-                </a:tc>
-                <a:tc>
-                  <a:txBody>
-                    <a:bodyPr/>
-                    <a:lstStyle/>
-                    <a:p>
-                      <a:r>
-                        <a:rPr lang="en-US" dirty="0"/>
-                        <a:t>Upper Band (% chg.)</a:t>
-                      </a:r>
-                    </a:p>
-                  </a:txBody>
-                  <a:tcPr/>
-                </a:tc>
-                <a:tc>
-                  <a:txBody>
-                    <a:bodyPr/>
-                    <a:lstStyle/>
-                    <a:p>
-                      <a:r>
-                        <a:rPr lang="en-US" dirty="0"/>
-                        <a:t>Lower Band (% chg.)</a:t>
-                      </a:r>
-                    </a:p>
-                  </a:txBody>
-                  <a:tcPr/>
-                </a:tc>
-                <a:extLst>
-                  <a:ext uri="{0D108BD9-81ED-4DB2-BD59-A6C34878D82A}">
-                    <a16:rowId xmlns:a16="http://schemas.microsoft.com/office/drawing/2014/main" val="1050015936"/>
-                  </a:ext>
-                </a:extLst>
-              </a:tr>
-              <a:tr h="370840">
-                <a:tc>
-                  <a:txBody>
-                    <a:bodyPr/>
-                    <a:lstStyle/>
-                    <a:p>
-                      <a:r>
-                        <a:rPr lang="en-US" dirty="0"/>
-                        <a:t>$1,079</a:t>
-                      </a:r>
-                    </a:p>
-                  </a:txBody>
-                  <a:tcPr/>
-                </a:tc>
-                <a:tc>
-                  <a:txBody>
-                    <a:bodyPr/>
-                    <a:lstStyle/>
-                    <a:p>
-                      <a:r>
-                        <a:rPr lang="en-US" dirty="0"/>
-                        <a:t>$192</a:t>
-                      </a:r>
-                    </a:p>
-                  </a:txBody>
-                  <a:tcPr/>
-                </a:tc>
-                <a:tc>
-                  <a:txBody>
-                    <a:bodyPr/>
-                    <a:lstStyle/>
-                    <a:p>
-                      <a:r>
-                        <a:rPr lang="en-US" dirty="0"/>
-                        <a:t>$1396</a:t>
-                      </a:r>
-                    </a:p>
-                  </a:txBody>
-                  <a:tcPr/>
-                </a:tc>
-                <a:tc>
-                  <a:txBody>
-                    <a:bodyPr/>
-                    <a:lstStyle/>
-                    <a:p>
-                      <a:r>
-                        <a:rPr lang="en-US" dirty="0"/>
-                        <a:t>$764</a:t>
-                      </a:r>
-                    </a:p>
-                  </a:txBody>
-                  <a:tcPr/>
-                </a:tc>
-                <a:tc>
-                  <a:txBody>
-                    <a:bodyPr/>
-                    <a:lstStyle/>
-                    <a:p>
-                      <a:r>
-                        <a:rPr lang="en-US" dirty="0"/>
-                        <a:t>+29%</a:t>
-                      </a:r>
-                    </a:p>
-                  </a:txBody>
-                  <a:tcPr/>
-                </a:tc>
-                <a:tc>
-                  <a:txBody>
-                    <a:bodyPr/>
-                    <a:lstStyle/>
-                    <a:p>
-                      <a:r>
-                        <a:rPr lang="en-US" dirty="0"/>
-                        <a:t>-26%</a:t>
-                      </a:r>
-                    </a:p>
-                  </a:txBody>
-                  <a:tcPr/>
-                </a:tc>
-                <a:extLst>
-                  <a:ext uri="{0D108BD9-81ED-4DB2-BD59-A6C34878D82A}">
-                    <a16:rowId xmlns:a16="http://schemas.microsoft.com/office/drawing/2014/main" val="150066975"/>
-                  </a:ext>
-                </a:extLst>
-              </a:tr>
-            </a:tbl>
-          </a:graphicData>
-        </a:graphic>
-      </p:graphicFrame>
-    </p:spTree>
-    <p:extLst>
-      <p:ext uri="{BB962C8B-B14F-4D97-AF65-F5344CB8AC3E}">
-        <p14:creationId xmlns:p14="http://schemas.microsoft.com/office/powerpoint/2010/main" val="2474224703"/>
-      </p:ext>
-    </p:extLst>
-  </p:cSld>
-  <p:clrMapOvr>
-    <a:masterClrMapping/>
-  </p:clrMapOvr>
-</p:sld>
-</file>
-
-<file path=ppt/slides/slide14.xml><?xml version="1.0" encoding="utf-8"?>
+<file path=ppt/slides/slide16.xml><?xml version="1.0" encoding="utf-8"?>
 <p:sld xmlns:a="http://schemas.openxmlformats.org/drawingml/2006/main" xmlns:r="http://schemas.openxmlformats.org/officeDocument/2006/relationships" xmlns:p="http://schemas.openxmlformats.org/presentationml/2006/main">
   <p:cSld>
     <p:spTree>
@@ -4621,7 +5086,7 @@
 </p:sld>
 </file>
 
-<file path=ppt/slides/slide15.xml><?xml version="1.0" encoding="utf-8"?>
+<file path=ppt/slides/slide17.xml><?xml version="1.0" encoding="utf-8"?>
 <p:sld xmlns:a="http://schemas.openxmlformats.org/drawingml/2006/main" xmlns:r="http://schemas.openxmlformats.org/officeDocument/2006/relationships" xmlns:p="http://schemas.openxmlformats.org/presentationml/2006/main">
   <p:cSld>
     <p:spTree>
@@ -4643,6 +5108,554 @@
           <p:cNvPr id="2" name="Title 1">
             <a:extLst>
               <a:ext uri="{FF2B5EF4-FFF2-40B4-BE49-F238E27FC236}">
+                <a16:creationId xmlns:a16="http://schemas.microsoft.com/office/drawing/2014/main" id="{FF02B413-E962-A7F2-3E59-2DABAD396F66}"/>
+              </a:ext>
+            </a:extLst>
+          </p:cNvPr>
+          <p:cNvSpPr>
+            <a:spLocks noGrp="1"/>
+          </p:cNvSpPr>
+          <p:nvPr>
+            <p:ph type="title"/>
+          </p:nvPr>
+        </p:nvSpPr>
+        <p:spPr/>
+        <p:txBody>
+          <a:bodyPr/>
+          <a:lstStyle/>
+          <a:p>
+            <a:r>
+              <a:rPr lang="en-US" dirty="0"/>
+              <a:t>Urea Price Index vs. Industrial Product Price Index (IPPI)</a:t>
+            </a:r>
+          </a:p>
+        </p:txBody>
+      </p:sp>
+      <p:pic>
+        <p:nvPicPr>
+          <p:cNvPr id="11" name="Content Placeholder 10">
+            <a:extLst>
+              <a:ext uri="{FF2B5EF4-FFF2-40B4-BE49-F238E27FC236}">
+                <a16:creationId xmlns:a16="http://schemas.microsoft.com/office/drawing/2014/main" id="{3D0EF10D-F092-E55B-5EE0-3EF71A1EED68}"/>
+              </a:ext>
+            </a:extLst>
+          </p:cNvPr>
+          <p:cNvPicPr>
+            <a:picLocks noGrp="1" noChangeAspect="1"/>
+          </p:cNvPicPr>
+          <p:nvPr>
+            <p:ph idx="1"/>
+          </p:nvPr>
+        </p:nvPicPr>
+        <p:blipFill>
+          <a:blip r:embed="rId3"/>
+          <a:stretch>
+            <a:fillRect/>
+          </a:stretch>
+        </p:blipFill>
+        <p:spPr>
+          <a:xfrm>
+            <a:off x="2452928" y="1825625"/>
+            <a:ext cx="7286143" cy="4351338"/>
+          </a:xfrm>
+          <a:prstGeom prst="rect">
+            <a:avLst/>
+          </a:prstGeom>
+        </p:spPr>
+      </p:pic>
+    </p:spTree>
+    <p:extLst>
+      <p:ext uri="{BB962C8B-B14F-4D97-AF65-F5344CB8AC3E}">
+        <p14:creationId xmlns:p14="http://schemas.microsoft.com/office/powerpoint/2010/main" val="674905813"/>
+      </p:ext>
+    </p:extLst>
+  </p:cSld>
+  <p:clrMapOvr>
+    <a:masterClrMapping/>
+  </p:clrMapOvr>
+</p:sld>
+</file>
+
+<file path=ppt/slides/slide18.xml><?xml version="1.0" encoding="utf-8"?>
+<p:sld xmlns:a="http://schemas.openxmlformats.org/drawingml/2006/main" xmlns:r="http://schemas.openxmlformats.org/officeDocument/2006/relationships" xmlns:p="http://schemas.openxmlformats.org/presentationml/2006/main">
+  <p:cSld>
+    <p:spTree>
+      <p:nvGrpSpPr>
+        <p:cNvPr id="1" name=""/>
+        <p:cNvGrpSpPr/>
+        <p:nvPr/>
+      </p:nvGrpSpPr>
+      <p:grpSpPr>
+        <a:xfrm>
+          <a:off x="0" y="0"/>
+          <a:ext cx="0" cy="0"/>
+          <a:chOff x="0" y="0"/>
+          <a:chExt cx="0" cy="0"/>
+        </a:xfrm>
+      </p:grpSpPr>
+      <p:sp>
+        <p:nvSpPr>
+          <p:cNvPr id="4" name="Title 3">
+            <a:extLst>
+              <a:ext uri="{FF2B5EF4-FFF2-40B4-BE49-F238E27FC236}">
+                <a16:creationId xmlns:a16="http://schemas.microsoft.com/office/drawing/2014/main" id="{FA71F9E7-E98A-136E-F5E5-BB9DEF3ADFFB}"/>
+              </a:ext>
+            </a:extLst>
+          </p:cNvPr>
+          <p:cNvSpPr>
+            <a:spLocks noGrp="1"/>
+          </p:cNvSpPr>
+          <p:nvPr>
+            <p:ph type="title"/>
+          </p:nvPr>
+        </p:nvSpPr>
+        <p:spPr/>
+        <p:txBody>
+          <a:bodyPr/>
+          <a:lstStyle/>
+          <a:p>
+            <a:r>
+              <a:rPr lang="en-US" dirty="0"/>
+              <a:t>4. Forecast</a:t>
+            </a:r>
+          </a:p>
+        </p:txBody>
+      </p:sp>
+      <p:sp>
+        <p:nvSpPr>
+          <p:cNvPr id="5" name="Text Placeholder 4">
+            <a:extLst>
+              <a:ext uri="{FF2B5EF4-FFF2-40B4-BE49-F238E27FC236}">
+                <a16:creationId xmlns:a16="http://schemas.microsoft.com/office/drawing/2014/main" id="{CB2BCCBF-7F96-2DD5-20D5-A9F3EB30BE0C}"/>
+              </a:ext>
+            </a:extLst>
+          </p:cNvPr>
+          <p:cNvSpPr>
+            <a:spLocks noGrp="1"/>
+          </p:cNvSpPr>
+          <p:nvPr>
+            <p:ph type="body" idx="1"/>
+          </p:nvPr>
+        </p:nvSpPr>
+        <p:spPr/>
+        <p:txBody>
+          <a:bodyPr/>
+          <a:lstStyle/>
+          <a:p>
+            <a:r>
+              <a:rPr lang="en-US" dirty="0"/>
+              <a:t>12-month ahead</a:t>
+            </a:r>
+          </a:p>
+        </p:txBody>
+      </p:sp>
+    </p:spTree>
+    <p:extLst>
+      <p:ext uri="{BB962C8B-B14F-4D97-AF65-F5344CB8AC3E}">
+        <p14:creationId xmlns:p14="http://schemas.microsoft.com/office/powerpoint/2010/main" val="3452668944"/>
+      </p:ext>
+    </p:extLst>
+  </p:cSld>
+  <p:clrMapOvr>
+    <a:masterClrMapping/>
+  </p:clrMapOvr>
+</p:sld>
+</file>
+
+<file path=ppt/slides/slide19.xml><?xml version="1.0" encoding="utf-8"?>
+<p:sld xmlns:a="http://schemas.openxmlformats.org/drawingml/2006/main" xmlns:r="http://schemas.openxmlformats.org/officeDocument/2006/relationships" xmlns:p="http://schemas.openxmlformats.org/presentationml/2006/main">
+  <p:cSld>
+    <p:spTree>
+      <p:nvGrpSpPr>
+        <p:cNvPr id="1" name=""/>
+        <p:cNvGrpSpPr/>
+        <p:nvPr/>
+      </p:nvGrpSpPr>
+      <p:grpSpPr>
+        <a:xfrm>
+          <a:off x="0" y="0"/>
+          <a:ext cx="0" cy="0"/>
+          <a:chOff x="0" y="0"/>
+          <a:chExt cx="0" cy="0"/>
+        </a:xfrm>
+      </p:grpSpPr>
+      <p:sp>
+        <p:nvSpPr>
+          <p:cNvPr id="2" name="Title 1">
+            <a:extLst>
+              <a:ext uri="{FF2B5EF4-FFF2-40B4-BE49-F238E27FC236}">
+                <a16:creationId xmlns:a16="http://schemas.microsoft.com/office/drawing/2014/main" id="{1E5A455A-9346-5413-C4F1-93270BDC5DE6}"/>
+              </a:ext>
+            </a:extLst>
+          </p:cNvPr>
+          <p:cNvSpPr>
+            <a:spLocks noGrp="1"/>
+          </p:cNvSpPr>
+          <p:nvPr>
+            <p:ph type="title"/>
+          </p:nvPr>
+        </p:nvSpPr>
+        <p:spPr/>
+        <p:txBody>
+          <a:bodyPr/>
+          <a:lstStyle/>
+          <a:p>
+            <a:r>
+              <a:rPr lang="en-US" dirty="0"/>
+              <a:t>Random Walk Model – Scenario Panning</a:t>
+            </a:r>
+          </a:p>
+        </p:txBody>
+      </p:sp>
+      <p:pic>
+        <p:nvPicPr>
+          <p:cNvPr id="6" name="Content Placeholder 5">
+            <a:extLst>
+              <a:ext uri="{FF2B5EF4-FFF2-40B4-BE49-F238E27FC236}">
+                <a16:creationId xmlns:a16="http://schemas.microsoft.com/office/drawing/2014/main" id="{7AB245AD-560F-3646-9A30-64D334EB6165}"/>
+              </a:ext>
+            </a:extLst>
+          </p:cNvPr>
+          <p:cNvPicPr>
+            <a:picLocks noGrp="1" noChangeAspect="1"/>
+          </p:cNvPicPr>
+          <p:nvPr>
+            <p:ph idx="1"/>
+          </p:nvPr>
+        </p:nvPicPr>
+        <p:blipFill>
+          <a:blip r:embed="rId3"/>
+          <a:stretch>
+            <a:fillRect/>
+          </a:stretch>
+        </p:blipFill>
+        <p:spPr>
+          <a:xfrm>
+            <a:off x="2438400" y="1573858"/>
+            <a:ext cx="7315200" cy="4356331"/>
+          </a:xfrm>
+          <a:prstGeom prst="rect">
+            <a:avLst/>
+          </a:prstGeom>
+        </p:spPr>
+      </p:pic>
+      <p:graphicFrame>
+        <p:nvGraphicFramePr>
+          <p:cNvPr id="7" name="Table 6">
+            <a:extLst>
+              <a:ext uri="{FF2B5EF4-FFF2-40B4-BE49-F238E27FC236}">
+                <a16:creationId xmlns:a16="http://schemas.microsoft.com/office/drawing/2014/main" id="{BE9337E4-8E26-F76B-036C-F98DD0126C67}"/>
+              </a:ext>
+            </a:extLst>
+          </p:cNvPr>
+          <p:cNvGraphicFramePr>
+            <a:graphicFrameLocks noGrp="1"/>
+          </p:cNvGraphicFramePr>
+          <p:nvPr>
+            <p:extLst>
+              <p:ext uri="{D42A27DB-BD31-4B8C-83A1-F6EECF244321}">
+                <p14:modId xmlns:p14="http://schemas.microsoft.com/office/powerpoint/2010/main" val="483479673"/>
+              </p:ext>
+            </p:extLst>
+          </p:nvPr>
+        </p:nvGraphicFramePr>
+        <p:xfrm>
+          <a:off x="2438400" y="5930189"/>
+          <a:ext cx="7315200" cy="914400"/>
+        </p:xfrm>
+        <a:graphic>
+          <a:graphicData uri="http://schemas.openxmlformats.org/drawingml/2006/table">
+            <a:tbl>
+              <a:tblPr firstRow="1" bandRow="1">
+                <a:tableStyleId>{5C22544A-7EE6-4342-B048-85BDC9FD1C3A}</a:tableStyleId>
+              </a:tblPr>
+              <a:tblGrid>
+                <a:gridCol w="1828800">
+                  <a:extLst>
+                    <a:ext uri="{9D8B030D-6E8A-4147-A177-3AD203B41FA5}">
+                      <a16:colId xmlns:a16="http://schemas.microsoft.com/office/drawing/2014/main" val="4155257274"/>
+                    </a:ext>
+                  </a:extLst>
+                </a:gridCol>
+                <a:gridCol w="1828800">
+                  <a:extLst>
+                    <a:ext uri="{9D8B030D-6E8A-4147-A177-3AD203B41FA5}">
+                      <a16:colId xmlns:a16="http://schemas.microsoft.com/office/drawing/2014/main" val="1784173928"/>
+                    </a:ext>
+                  </a:extLst>
+                </a:gridCol>
+                <a:gridCol w="1828800">
+                  <a:extLst>
+                    <a:ext uri="{9D8B030D-6E8A-4147-A177-3AD203B41FA5}">
+                      <a16:colId xmlns:a16="http://schemas.microsoft.com/office/drawing/2014/main" val="1622761043"/>
+                    </a:ext>
+                  </a:extLst>
+                </a:gridCol>
+                <a:gridCol w="1828800">
+                  <a:extLst>
+                    <a:ext uri="{9D8B030D-6E8A-4147-A177-3AD203B41FA5}">
+                      <a16:colId xmlns:a16="http://schemas.microsoft.com/office/drawing/2014/main" val="990677731"/>
+                    </a:ext>
+                  </a:extLst>
+                </a:gridCol>
+              </a:tblGrid>
+              <a:tr h="565709">
+                <a:tc>
+                  <a:txBody>
+                    <a:bodyPr/>
+                    <a:lstStyle/>
+                    <a:p>
+                      <a:r>
+                        <a:rPr lang="en-US" sz="1600" dirty="0"/>
+                        <a:t>Price (Sep 2026)</a:t>
+                      </a:r>
+                    </a:p>
+                  </a:txBody>
+                  <a:tcPr/>
+                </a:tc>
+                <a:tc>
+                  <a:txBody>
+                    <a:bodyPr/>
+                    <a:lstStyle/>
+                    <a:p>
+                      <a:r>
+                        <a:rPr lang="en-US" sz="1600" dirty="0"/>
+                        <a:t>Std Error</a:t>
+                      </a:r>
+                    </a:p>
+                  </a:txBody>
+                  <a:tcPr/>
+                </a:tc>
+                <a:tc>
+                  <a:txBody>
+                    <a:bodyPr/>
+                    <a:lstStyle/>
+                    <a:p>
+                      <a:r>
+                        <a:rPr lang="en-US" sz="1600" dirty="0"/>
+                        <a:t>Lower Band (5%)</a:t>
+                      </a:r>
+                    </a:p>
+                  </a:txBody>
+                  <a:tcPr/>
+                </a:tc>
+                <a:tc>
+                  <a:txBody>
+                    <a:bodyPr/>
+                    <a:lstStyle/>
+                    <a:p>
+                      <a:r>
+                        <a:rPr lang="en-US" sz="1600" dirty="0"/>
+                        <a:t>Upper Band (95%)</a:t>
+                      </a:r>
+                    </a:p>
+                  </a:txBody>
+                  <a:tcPr/>
+                </a:tc>
+                <a:extLst>
+                  <a:ext uri="{0D108BD9-81ED-4DB2-BD59-A6C34878D82A}">
+                    <a16:rowId xmlns:a16="http://schemas.microsoft.com/office/drawing/2014/main" val="1050015936"/>
+                  </a:ext>
+                </a:extLst>
+              </a:tr>
+              <a:tr h="348691">
+                <a:tc>
+                  <a:txBody>
+                    <a:bodyPr/>
+                    <a:lstStyle/>
+                    <a:p>
+                      <a:r>
+                        <a:rPr lang="en-US" sz="1600" dirty="0"/>
+                        <a:t>$1,102 (+3.9%)</a:t>
+                      </a:r>
+                    </a:p>
+                  </a:txBody>
+                  <a:tcPr/>
+                </a:tc>
+                <a:tc>
+                  <a:txBody>
+                    <a:bodyPr/>
+                    <a:lstStyle/>
+                    <a:p>
+                      <a:r>
+                        <a:rPr lang="en-US" sz="1600" dirty="0"/>
+                        <a:t>$207</a:t>
+                      </a:r>
+                    </a:p>
+                  </a:txBody>
+                  <a:tcPr/>
+                </a:tc>
+                <a:tc>
+                  <a:txBody>
+                    <a:bodyPr/>
+                    <a:lstStyle/>
+                    <a:p>
+                      <a:r>
+                        <a:rPr lang="en-US" sz="1600" dirty="0"/>
+                        <a:t>$761 (-27%)</a:t>
+                      </a:r>
+                    </a:p>
+                  </a:txBody>
+                  <a:tcPr/>
+                </a:tc>
+                <a:tc>
+                  <a:txBody>
+                    <a:bodyPr/>
+                    <a:lstStyle/>
+                    <a:p>
+                      <a:r>
+                        <a:rPr lang="en-US" sz="1600" dirty="0"/>
+                        <a:t>$1443 (+39%)</a:t>
+                      </a:r>
+                    </a:p>
+                  </a:txBody>
+                  <a:tcPr/>
+                </a:tc>
+                <a:extLst>
+                  <a:ext uri="{0D108BD9-81ED-4DB2-BD59-A6C34878D82A}">
+                    <a16:rowId xmlns:a16="http://schemas.microsoft.com/office/drawing/2014/main" val="150066975"/>
+                  </a:ext>
+                </a:extLst>
+              </a:tr>
+            </a:tbl>
+          </a:graphicData>
+        </a:graphic>
+      </p:graphicFrame>
+    </p:spTree>
+    <p:extLst>
+      <p:ext uri="{BB962C8B-B14F-4D97-AF65-F5344CB8AC3E}">
+        <p14:creationId xmlns:p14="http://schemas.microsoft.com/office/powerpoint/2010/main" val="499456963"/>
+      </p:ext>
+    </p:extLst>
+  </p:cSld>
+  <p:clrMapOvr>
+    <a:masterClrMapping/>
+  </p:clrMapOvr>
+</p:sld>
+</file>
+
+<file path=ppt/slides/slide2.xml><?xml version="1.0" encoding="utf-8"?>
+<p:sld xmlns:a="http://schemas.openxmlformats.org/drawingml/2006/main" xmlns:r="http://schemas.openxmlformats.org/officeDocument/2006/relationships" xmlns:p="http://schemas.openxmlformats.org/presentationml/2006/main">
+  <p:cSld>
+    <p:spTree>
+      <p:nvGrpSpPr>
+        <p:cNvPr id="1" name=""/>
+        <p:cNvGrpSpPr/>
+        <p:nvPr/>
+      </p:nvGrpSpPr>
+      <p:grpSpPr>
+        <a:xfrm>
+          <a:off x="0" y="0"/>
+          <a:ext cx="0" cy="0"/>
+          <a:chOff x="0" y="0"/>
+          <a:chExt cx="0" cy="0"/>
+        </a:xfrm>
+      </p:grpSpPr>
+      <p:sp>
+        <p:nvSpPr>
+          <p:cNvPr id="2" name="Title 1">
+            <a:extLst>
+              <a:ext uri="{FF2B5EF4-FFF2-40B4-BE49-F238E27FC236}">
+                <a16:creationId xmlns:a16="http://schemas.microsoft.com/office/drawing/2014/main" id="{637BCFEF-9BD5-38F8-8E11-288C5917736B}"/>
+              </a:ext>
+            </a:extLst>
+          </p:cNvPr>
+          <p:cNvSpPr>
+            <a:spLocks noGrp="1"/>
+          </p:cNvSpPr>
+          <p:nvPr>
+            <p:ph type="title"/>
+          </p:nvPr>
+        </p:nvSpPr>
+        <p:spPr/>
+        <p:txBody>
+          <a:bodyPr/>
+          <a:lstStyle/>
+          <a:p>
+            <a:r>
+              <a:rPr lang="en-US" dirty="0"/>
+              <a:t>Process</a:t>
+            </a:r>
+          </a:p>
+        </p:txBody>
+      </p:sp>
+      <p:sp>
+        <p:nvSpPr>
+          <p:cNvPr id="3" name="Content Placeholder 2">
+            <a:extLst>
+              <a:ext uri="{FF2B5EF4-FFF2-40B4-BE49-F238E27FC236}">
+                <a16:creationId xmlns:a16="http://schemas.microsoft.com/office/drawing/2014/main" id="{C8E02D71-7A25-D82F-F437-4FB1DE9B68BE}"/>
+              </a:ext>
+            </a:extLst>
+          </p:cNvPr>
+          <p:cNvSpPr>
+            <a:spLocks noGrp="1"/>
+          </p:cNvSpPr>
+          <p:nvPr>
+            <p:ph idx="1"/>
+          </p:nvPr>
+        </p:nvSpPr>
+        <p:spPr/>
+        <p:txBody>
+          <a:bodyPr/>
+          <a:lstStyle/>
+          <a:p>
+            <a:pPr marL="514350" indent="-514350">
+              <a:buFont typeface="+mj-lt"/>
+              <a:buAutoNum type="arabicPeriod"/>
+            </a:pPr>
+            <a:r>
+              <a:rPr lang="en-US" dirty="0"/>
+              <a:t>Forecast FOB prices for general direction and possible range of moves</a:t>
+            </a:r>
+          </a:p>
+          <a:p>
+            <a:pPr marL="514350" indent="-514350">
+              <a:buFont typeface="+mj-lt"/>
+              <a:buAutoNum type="arabicPeriod"/>
+            </a:pPr>
+            <a:r>
+              <a:rPr lang="en-US" dirty="0"/>
+              <a:t>Use the difference between Alberta and FOB prices for timing the purchase.</a:t>
+            </a:r>
+          </a:p>
+        </p:txBody>
+      </p:sp>
+    </p:spTree>
+    <p:extLst>
+      <p:ext uri="{BB962C8B-B14F-4D97-AF65-F5344CB8AC3E}">
+        <p14:creationId xmlns:p14="http://schemas.microsoft.com/office/powerpoint/2010/main" val="3455321472"/>
+      </p:ext>
+    </p:extLst>
+  </p:cSld>
+  <p:clrMapOvr>
+    <a:masterClrMapping/>
+  </p:clrMapOvr>
+</p:sld>
+</file>
+
+<file path=ppt/slides/slide20.xml><?xml version="1.0" encoding="utf-8"?>
+<p:sld xmlns:a="http://schemas.openxmlformats.org/drawingml/2006/main" xmlns:r="http://schemas.openxmlformats.org/officeDocument/2006/relationships" xmlns:p="http://schemas.openxmlformats.org/presentationml/2006/main">
+  <p:cSld>
+    <p:spTree>
+      <p:nvGrpSpPr>
+        <p:cNvPr id="1" name=""/>
+        <p:cNvGrpSpPr/>
+        <p:nvPr/>
+      </p:nvGrpSpPr>
+      <p:grpSpPr>
+        <a:xfrm>
+          <a:off x="0" y="0"/>
+          <a:ext cx="0" cy="0"/>
+          <a:chOff x="0" y="0"/>
+          <a:chExt cx="0" cy="0"/>
+        </a:xfrm>
+      </p:grpSpPr>
+      <p:sp>
+        <p:nvSpPr>
+          <p:cNvPr id="2" name="Title 1">
+            <a:extLst>
+              <a:ext uri="{FF2B5EF4-FFF2-40B4-BE49-F238E27FC236}">
                 <a16:creationId xmlns:a16="http://schemas.microsoft.com/office/drawing/2014/main" id="{2E00A1BE-9319-DD0E-F720-08CD26376CAE}"/>
               </a:ext>
             </a:extLst>
@@ -4656,41 +5669,50 @@
         </p:nvSpPr>
         <p:spPr/>
         <p:txBody>
-          <a:bodyPr/>
+          <a:bodyPr>
+            <a:normAutofit/>
+          </a:bodyPr>
           <a:lstStyle/>
           <a:p>
             <a:r>
               <a:rPr lang="en-US" dirty="0"/>
-              <a:t>FOB Black Sea – Regression Model</a:t>
-            </a:r>
-          </a:p>
-        </p:txBody>
-      </p:sp>
-      <p:sp>
-        <p:nvSpPr>
-          <p:cNvPr id="7" name="Content Placeholder 6">
-            <a:extLst>
-              <a:ext uri="{FF2B5EF4-FFF2-40B4-BE49-F238E27FC236}">
-                <a16:creationId xmlns:a16="http://schemas.microsoft.com/office/drawing/2014/main" id="{5F51C12C-A88B-DD85-6662-1A1E5625471C}"/>
-              </a:ext>
-            </a:extLst>
-          </p:cNvPr>
-          <p:cNvSpPr>
-            <a:spLocks noGrp="1"/>
-          </p:cNvSpPr>
+              <a:t>Regression Model – Price reverts to the mean after shocks</a:t>
+            </a:r>
+          </a:p>
+        </p:txBody>
+      </p:sp>
+      <p:pic>
+        <p:nvPicPr>
+          <p:cNvPr id="4" name="Content Placeholder 3">
+            <a:extLst>
+              <a:ext uri="{FF2B5EF4-FFF2-40B4-BE49-F238E27FC236}">
+                <a16:creationId xmlns:a16="http://schemas.microsoft.com/office/drawing/2014/main" id="{18B988CC-750C-6DB4-8CF6-6FB441A0E26A}"/>
+              </a:ext>
+            </a:extLst>
+          </p:cNvPr>
+          <p:cNvPicPr>
+            <a:picLocks noGrp="1" noChangeAspect="1"/>
+          </p:cNvPicPr>
           <p:nvPr>
             <p:ph idx="1"/>
           </p:nvPr>
-        </p:nvSpPr>
-        <p:spPr/>
-        <p:txBody>
-          <a:bodyPr/>
-          <a:lstStyle/>
-          <a:p>
-            <a:endParaRPr lang="en-US"/>
-          </a:p>
-        </p:txBody>
-      </p:sp>
+        </p:nvPicPr>
+        <p:blipFill>
+          <a:blip r:embed="rId2"/>
+          <a:stretch>
+            <a:fillRect/>
+          </a:stretch>
+        </p:blipFill>
+        <p:spPr>
+          <a:xfrm>
+            <a:off x="2408024" y="1825625"/>
+            <a:ext cx="7375951" cy="4351338"/>
+          </a:xfrm>
+          <a:prstGeom prst="rect">
+            <a:avLst/>
+          </a:prstGeom>
+        </p:spPr>
+      </p:pic>
     </p:spTree>
     <p:extLst>
       <p:ext uri="{BB962C8B-B14F-4D97-AF65-F5344CB8AC3E}">
@@ -4704,7 +5726,646 @@
 </p:sld>
 </file>
 
-<file path=ppt/slides/slide16.xml><?xml version="1.0" encoding="utf-8"?>
+<file path=ppt/slides/slide21.xml><?xml version="1.0" encoding="utf-8"?>
+<p:sld xmlns:a="http://schemas.openxmlformats.org/drawingml/2006/main" xmlns:r="http://schemas.openxmlformats.org/officeDocument/2006/relationships" xmlns:p="http://schemas.openxmlformats.org/presentationml/2006/main">
+  <p:cSld>
+    <p:spTree>
+      <p:nvGrpSpPr>
+        <p:cNvPr id="1" name="">
+          <a:extLst>
+            <a:ext uri="{FF2B5EF4-FFF2-40B4-BE49-F238E27FC236}">
+              <a16:creationId xmlns:a16="http://schemas.microsoft.com/office/drawing/2014/main" id="{F8FC5E6E-9B24-DA3B-2D6D-D14623F41083}"/>
+            </a:ext>
+          </a:extLst>
+        </p:cNvPr>
+        <p:cNvGrpSpPr/>
+        <p:nvPr/>
+      </p:nvGrpSpPr>
+      <p:grpSpPr>
+        <a:xfrm>
+          <a:off x="0" y="0"/>
+          <a:ext cx="0" cy="0"/>
+          <a:chOff x="0" y="0"/>
+          <a:chExt cx="0" cy="0"/>
+        </a:xfrm>
+      </p:grpSpPr>
+      <p:sp>
+        <p:nvSpPr>
+          <p:cNvPr id="2" name="Title 1">
+            <a:extLst>
+              <a:ext uri="{FF2B5EF4-FFF2-40B4-BE49-F238E27FC236}">
+                <a16:creationId xmlns:a16="http://schemas.microsoft.com/office/drawing/2014/main" id="{28203030-2E92-9701-05AA-B3BE90551456}"/>
+              </a:ext>
+            </a:extLst>
+          </p:cNvPr>
+          <p:cNvSpPr>
+            <a:spLocks noGrp="1"/>
+          </p:cNvSpPr>
+          <p:nvPr>
+            <p:ph type="title"/>
+          </p:nvPr>
+        </p:nvSpPr>
+        <p:spPr/>
+        <p:txBody>
+          <a:bodyPr/>
+          <a:lstStyle/>
+          <a:p>
+            <a:r>
+              <a:rPr lang="en-US" dirty="0"/>
+              <a:t>Urea, FOB Black Sea – Forecast</a:t>
+            </a:r>
+          </a:p>
+        </p:txBody>
+      </p:sp>
+      <p:graphicFrame>
+        <p:nvGraphicFramePr>
+          <p:cNvPr id="7" name="Table 6">
+            <a:extLst>
+              <a:ext uri="{FF2B5EF4-FFF2-40B4-BE49-F238E27FC236}">
+                <a16:creationId xmlns:a16="http://schemas.microsoft.com/office/drawing/2014/main" id="{F7AAC692-73EF-B535-3B55-0571BA6254FE}"/>
+              </a:ext>
+            </a:extLst>
+          </p:cNvPr>
+          <p:cNvGraphicFramePr>
+            <a:graphicFrameLocks noGrp="1"/>
+          </p:cNvGraphicFramePr>
+          <p:nvPr>
+            <p:extLst>
+              <p:ext uri="{D42A27DB-BD31-4B8C-83A1-F6EECF244321}">
+                <p14:modId xmlns:p14="http://schemas.microsoft.com/office/powerpoint/2010/main" val="2826217474"/>
+              </p:ext>
+            </p:extLst>
+          </p:nvPr>
+        </p:nvGraphicFramePr>
+        <p:xfrm>
+          <a:off x="2438399" y="5931747"/>
+          <a:ext cx="7315200" cy="914400"/>
+        </p:xfrm>
+        <a:graphic>
+          <a:graphicData uri="http://schemas.openxmlformats.org/drawingml/2006/table">
+            <a:tbl>
+              <a:tblPr firstRow="1" bandRow="1">
+                <a:tableStyleId>{5C22544A-7EE6-4342-B048-85BDC9FD1C3A}</a:tableStyleId>
+              </a:tblPr>
+              <a:tblGrid>
+                <a:gridCol w="1828800">
+                  <a:extLst>
+                    <a:ext uri="{9D8B030D-6E8A-4147-A177-3AD203B41FA5}">
+                      <a16:colId xmlns:a16="http://schemas.microsoft.com/office/drawing/2014/main" val="4155257274"/>
+                    </a:ext>
+                  </a:extLst>
+                </a:gridCol>
+                <a:gridCol w="1828800">
+                  <a:extLst>
+                    <a:ext uri="{9D8B030D-6E8A-4147-A177-3AD203B41FA5}">
+                      <a16:colId xmlns:a16="http://schemas.microsoft.com/office/drawing/2014/main" val="1784173928"/>
+                    </a:ext>
+                  </a:extLst>
+                </a:gridCol>
+                <a:gridCol w="1828800">
+                  <a:extLst>
+                    <a:ext uri="{9D8B030D-6E8A-4147-A177-3AD203B41FA5}">
+                      <a16:colId xmlns:a16="http://schemas.microsoft.com/office/drawing/2014/main" val="1622761043"/>
+                    </a:ext>
+                  </a:extLst>
+                </a:gridCol>
+                <a:gridCol w="1828800">
+                  <a:extLst>
+                    <a:ext uri="{9D8B030D-6E8A-4147-A177-3AD203B41FA5}">
+                      <a16:colId xmlns:a16="http://schemas.microsoft.com/office/drawing/2014/main" val="990677731"/>
+                    </a:ext>
+                  </a:extLst>
+                </a:gridCol>
+              </a:tblGrid>
+              <a:tr h="565709">
+                <a:tc>
+                  <a:txBody>
+                    <a:bodyPr/>
+                    <a:lstStyle/>
+                    <a:p>
+                      <a:r>
+                        <a:rPr lang="en-US" sz="1600" dirty="0"/>
+                        <a:t>Price (Sep 2026)</a:t>
+                      </a:r>
+                    </a:p>
+                  </a:txBody>
+                  <a:tcPr/>
+                </a:tc>
+                <a:tc>
+                  <a:txBody>
+                    <a:bodyPr/>
+                    <a:lstStyle/>
+                    <a:p>
+                      <a:r>
+                        <a:rPr lang="en-US" sz="1600" dirty="0"/>
+                        <a:t>Std Error</a:t>
+                      </a:r>
+                    </a:p>
+                  </a:txBody>
+                  <a:tcPr/>
+                </a:tc>
+                <a:tc>
+                  <a:txBody>
+                    <a:bodyPr/>
+                    <a:lstStyle/>
+                    <a:p>
+                      <a:r>
+                        <a:rPr lang="en-US" sz="1600" dirty="0"/>
+                        <a:t>Lower Band (5%)</a:t>
+                      </a:r>
+                    </a:p>
+                  </a:txBody>
+                  <a:tcPr/>
+                </a:tc>
+                <a:tc>
+                  <a:txBody>
+                    <a:bodyPr/>
+                    <a:lstStyle/>
+                    <a:p>
+                      <a:r>
+                        <a:rPr lang="en-US" sz="1600" dirty="0"/>
+                        <a:t>Upper Band (95%)</a:t>
+                      </a:r>
+                    </a:p>
+                  </a:txBody>
+                  <a:tcPr/>
+                </a:tc>
+                <a:extLst>
+                  <a:ext uri="{0D108BD9-81ED-4DB2-BD59-A6C34878D82A}">
+                    <a16:rowId xmlns:a16="http://schemas.microsoft.com/office/drawing/2014/main" val="1050015936"/>
+                  </a:ext>
+                </a:extLst>
+              </a:tr>
+              <a:tr h="348691">
+                <a:tc>
+                  <a:txBody>
+                    <a:bodyPr/>
+                    <a:lstStyle/>
+                    <a:p>
+                      <a:r>
+                        <a:rPr lang="en-US" sz="1600" dirty="0"/>
+                        <a:t>$587 (+2%)</a:t>
+                      </a:r>
+                    </a:p>
+                  </a:txBody>
+                  <a:tcPr/>
+                </a:tc>
+                <a:tc>
+                  <a:txBody>
+                    <a:bodyPr/>
+                    <a:lstStyle/>
+                    <a:p>
+                      <a:r>
+                        <a:rPr lang="en-US" sz="1600" dirty="0"/>
+                        <a:t>$102</a:t>
+                      </a:r>
+                    </a:p>
+                  </a:txBody>
+                  <a:tcPr/>
+                </a:tc>
+                <a:tc>
+                  <a:txBody>
+                    <a:bodyPr/>
+                    <a:lstStyle/>
+                    <a:p>
+                      <a:r>
+                        <a:rPr lang="en-US" sz="1600" dirty="0"/>
+                        <a:t>418 (-27%)</a:t>
+                      </a:r>
+                    </a:p>
+                  </a:txBody>
+                  <a:tcPr/>
+                </a:tc>
+                <a:tc>
+                  <a:txBody>
+                    <a:bodyPr/>
+                    <a:lstStyle/>
+                    <a:p>
+                      <a:r>
+                        <a:rPr lang="en-US" sz="1600" dirty="0"/>
+                        <a:t>755 (+31%)</a:t>
+                      </a:r>
+                    </a:p>
+                  </a:txBody>
+                  <a:tcPr/>
+                </a:tc>
+                <a:extLst>
+                  <a:ext uri="{0D108BD9-81ED-4DB2-BD59-A6C34878D82A}">
+                    <a16:rowId xmlns:a16="http://schemas.microsoft.com/office/drawing/2014/main" val="150066975"/>
+                  </a:ext>
+                </a:extLst>
+              </a:tr>
+            </a:tbl>
+          </a:graphicData>
+        </a:graphic>
+      </p:graphicFrame>
+      <p:pic>
+        <p:nvPicPr>
+          <p:cNvPr id="14" name="Content Placeholder 13">
+            <a:extLst>
+              <a:ext uri="{FF2B5EF4-FFF2-40B4-BE49-F238E27FC236}">
+                <a16:creationId xmlns:a16="http://schemas.microsoft.com/office/drawing/2014/main" id="{20E1FD88-1C0A-46E8-596F-B63736BC5FAA}"/>
+              </a:ext>
+            </a:extLst>
+          </p:cNvPr>
+          <p:cNvPicPr>
+            <a:picLocks noGrp="1" noChangeAspect="1"/>
+          </p:cNvPicPr>
+          <p:nvPr>
+            <p:ph idx="1"/>
+          </p:nvPr>
+        </p:nvPicPr>
+        <p:blipFill>
+          <a:blip r:embed="rId3"/>
+          <a:stretch>
+            <a:fillRect/>
+          </a:stretch>
+        </p:blipFill>
+        <p:spPr>
+          <a:xfrm>
+            <a:off x="2438399" y="1478669"/>
+            <a:ext cx="7315200" cy="4453078"/>
+          </a:xfrm>
+          <a:prstGeom prst="rect">
+            <a:avLst/>
+          </a:prstGeom>
+        </p:spPr>
+      </p:pic>
+    </p:spTree>
+    <p:extLst>
+      <p:ext uri="{BB962C8B-B14F-4D97-AF65-F5344CB8AC3E}">
+        <p14:creationId xmlns:p14="http://schemas.microsoft.com/office/powerpoint/2010/main" val="1375931470"/>
+      </p:ext>
+    </p:extLst>
+  </p:cSld>
+  <p:clrMapOvr>
+    <a:masterClrMapping/>
+  </p:clrMapOvr>
+</p:sld>
+</file>
+
+<file path=ppt/slides/slide22.xml><?xml version="1.0" encoding="utf-8"?>
+<p:sld xmlns:a="http://schemas.openxmlformats.org/drawingml/2006/main" xmlns:r="http://schemas.openxmlformats.org/officeDocument/2006/relationships" xmlns:p="http://schemas.openxmlformats.org/presentationml/2006/main">
+  <p:cSld>
+    <p:spTree>
+      <p:nvGrpSpPr>
+        <p:cNvPr id="1" name="">
+          <a:extLst>
+            <a:ext uri="{FF2B5EF4-FFF2-40B4-BE49-F238E27FC236}">
+              <a16:creationId xmlns:a16="http://schemas.microsoft.com/office/drawing/2014/main" id="{3AF31484-817D-E8AC-FA19-06B654516840}"/>
+            </a:ext>
+          </a:extLst>
+        </p:cNvPr>
+        <p:cNvGrpSpPr/>
+        <p:nvPr/>
+      </p:nvGrpSpPr>
+      <p:grpSpPr>
+        <a:xfrm>
+          <a:off x="0" y="0"/>
+          <a:ext cx="0" cy="0"/>
+          <a:chOff x="0" y="0"/>
+          <a:chExt cx="0" cy="0"/>
+        </a:xfrm>
+      </p:grpSpPr>
+      <p:sp>
+        <p:nvSpPr>
+          <p:cNvPr id="2" name="Title 1">
+            <a:extLst>
+              <a:ext uri="{FF2B5EF4-FFF2-40B4-BE49-F238E27FC236}">
+                <a16:creationId xmlns:a16="http://schemas.microsoft.com/office/drawing/2014/main" id="{252E5A9A-0E5D-572B-3E1C-7F7163093951}"/>
+              </a:ext>
+            </a:extLst>
+          </p:cNvPr>
+          <p:cNvSpPr>
+            <a:spLocks noGrp="1"/>
+          </p:cNvSpPr>
+          <p:nvPr>
+            <p:ph type="title"/>
+          </p:nvPr>
+        </p:nvSpPr>
+        <p:spPr/>
+        <p:txBody>
+          <a:bodyPr/>
+          <a:lstStyle/>
+          <a:p>
+            <a:r>
+              <a:rPr lang="en-US" dirty="0"/>
+              <a:t>Urea, Alberta – Forecast </a:t>
+            </a:r>
+          </a:p>
+        </p:txBody>
+      </p:sp>
+      <p:graphicFrame>
+        <p:nvGraphicFramePr>
+          <p:cNvPr id="7" name="Table 6">
+            <a:extLst>
+              <a:ext uri="{FF2B5EF4-FFF2-40B4-BE49-F238E27FC236}">
+                <a16:creationId xmlns:a16="http://schemas.microsoft.com/office/drawing/2014/main" id="{1762F6F8-323A-D4DD-1577-BB0FA81E464F}"/>
+              </a:ext>
+            </a:extLst>
+          </p:cNvPr>
+          <p:cNvGraphicFramePr>
+            <a:graphicFrameLocks noGrp="1"/>
+          </p:cNvGraphicFramePr>
+          <p:nvPr>
+            <p:extLst>
+              <p:ext uri="{D42A27DB-BD31-4B8C-83A1-F6EECF244321}">
+                <p14:modId xmlns:p14="http://schemas.microsoft.com/office/powerpoint/2010/main" val="789714018"/>
+              </p:ext>
+            </p:extLst>
+          </p:nvPr>
+        </p:nvGraphicFramePr>
+        <p:xfrm>
+          <a:off x="2438400" y="5943600"/>
+          <a:ext cx="7315200" cy="900989"/>
+        </p:xfrm>
+        <a:graphic>
+          <a:graphicData uri="http://schemas.openxmlformats.org/drawingml/2006/table">
+            <a:tbl>
+              <a:tblPr firstRow="1" bandRow="1">
+                <a:tableStyleId>{5C22544A-7EE6-4342-B048-85BDC9FD1C3A}</a:tableStyleId>
+              </a:tblPr>
+              <a:tblGrid>
+                <a:gridCol w="1828800">
+                  <a:extLst>
+                    <a:ext uri="{9D8B030D-6E8A-4147-A177-3AD203B41FA5}">
+                      <a16:colId xmlns:a16="http://schemas.microsoft.com/office/drawing/2014/main" val="4155257274"/>
+                    </a:ext>
+                  </a:extLst>
+                </a:gridCol>
+                <a:gridCol w="1828800">
+                  <a:extLst>
+                    <a:ext uri="{9D8B030D-6E8A-4147-A177-3AD203B41FA5}">
+                      <a16:colId xmlns:a16="http://schemas.microsoft.com/office/drawing/2014/main" val="1784173928"/>
+                    </a:ext>
+                  </a:extLst>
+                </a:gridCol>
+                <a:gridCol w="1828800">
+                  <a:extLst>
+                    <a:ext uri="{9D8B030D-6E8A-4147-A177-3AD203B41FA5}">
+                      <a16:colId xmlns:a16="http://schemas.microsoft.com/office/drawing/2014/main" val="1622761043"/>
+                    </a:ext>
+                  </a:extLst>
+                </a:gridCol>
+                <a:gridCol w="1828800">
+                  <a:extLst>
+                    <a:ext uri="{9D8B030D-6E8A-4147-A177-3AD203B41FA5}">
+                      <a16:colId xmlns:a16="http://schemas.microsoft.com/office/drawing/2014/main" val="990677731"/>
+                    </a:ext>
+                  </a:extLst>
+                </a:gridCol>
+              </a:tblGrid>
+              <a:tr h="565709">
+                <a:tc>
+                  <a:txBody>
+                    <a:bodyPr/>
+                    <a:lstStyle/>
+                    <a:p>
+                      <a:r>
+                        <a:rPr lang="en-US" sz="1600" dirty="0"/>
+                        <a:t>Price (Sep 2026)</a:t>
+                      </a:r>
+                    </a:p>
+                  </a:txBody>
+                  <a:tcPr/>
+                </a:tc>
+                <a:tc>
+                  <a:txBody>
+                    <a:bodyPr/>
+                    <a:lstStyle/>
+                    <a:p>
+                      <a:r>
+                        <a:rPr lang="en-US" sz="1600" dirty="0"/>
+                        <a:t>Std Error</a:t>
+                      </a:r>
+                    </a:p>
+                  </a:txBody>
+                  <a:tcPr/>
+                </a:tc>
+                <a:tc>
+                  <a:txBody>
+                    <a:bodyPr/>
+                    <a:lstStyle/>
+                    <a:p>
+                      <a:r>
+                        <a:rPr lang="en-US" sz="1600" dirty="0"/>
+                        <a:t>Lower Band (5%)</a:t>
+                      </a:r>
+                    </a:p>
+                  </a:txBody>
+                  <a:tcPr/>
+                </a:tc>
+                <a:tc>
+                  <a:txBody>
+                    <a:bodyPr/>
+                    <a:lstStyle/>
+                    <a:p>
+                      <a:r>
+                        <a:rPr lang="en-US" sz="1600" dirty="0"/>
+                        <a:t>Upper Band (5%)</a:t>
+                      </a:r>
+                    </a:p>
+                  </a:txBody>
+                  <a:tcPr/>
+                </a:tc>
+                <a:extLst>
+                  <a:ext uri="{0D108BD9-81ED-4DB2-BD59-A6C34878D82A}">
+                    <a16:rowId xmlns:a16="http://schemas.microsoft.com/office/drawing/2014/main" val="1050015936"/>
+                  </a:ext>
+                </a:extLst>
+              </a:tr>
+              <a:tr h="0">
+                <a:tc>
+                  <a:txBody>
+                    <a:bodyPr/>
+                    <a:lstStyle/>
+                    <a:p>
+                      <a:r>
+                        <a:rPr lang="en-US" sz="1600" dirty="0"/>
+                        <a:t>$872 (-16%)</a:t>
+                      </a:r>
+                    </a:p>
+                  </a:txBody>
+                  <a:tcPr/>
+                </a:tc>
+                <a:tc>
+                  <a:txBody>
+                    <a:bodyPr/>
+                    <a:lstStyle/>
+                    <a:p>
+                      <a:r>
+                        <a:rPr lang="en-US" sz="1600" dirty="0"/>
+                        <a:t>$109</a:t>
+                      </a:r>
+                    </a:p>
+                  </a:txBody>
+                  <a:tcPr/>
+                </a:tc>
+                <a:tc>
+                  <a:txBody>
+                    <a:bodyPr/>
+                    <a:lstStyle/>
+                    <a:p>
+                      <a:r>
+                        <a:rPr lang="en-US" sz="1600" dirty="0"/>
+                        <a:t>$691 (-33%)</a:t>
+                      </a:r>
+                    </a:p>
+                  </a:txBody>
+                  <a:tcPr/>
+                </a:tc>
+                <a:tc>
+                  <a:txBody>
+                    <a:bodyPr/>
+                    <a:lstStyle/>
+                    <a:p>
+                      <a:r>
+                        <a:rPr lang="en-US" sz="1600" dirty="0"/>
+                        <a:t>$1054 (2%)</a:t>
+                      </a:r>
+                    </a:p>
+                  </a:txBody>
+                  <a:tcPr/>
+                </a:tc>
+                <a:extLst>
+                  <a:ext uri="{0D108BD9-81ED-4DB2-BD59-A6C34878D82A}">
+                    <a16:rowId xmlns:a16="http://schemas.microsoft.com/office/drawing/2014/main" val="150066975"/>
+                  </a:ext>
+                </a:extLst>
+              </a:tr>
+            </a:tbl>
+          </a:graphicData>
+        </a:graphic>
+      </p:graphicFrame>
+      <p:pic>
+        <p:nvPicPr>
+          <p:cNvPr id="6" name="Content Placeholder 5">
+            <a:extLst>
+              <a:ext uri="{FF2B5EF4-FFF2-40B4-BE49-F238E27FC236}">
+                <a16:creationId xmlns:a16="http://schemas.microsoft.com/office/drawing/2014/main" id="{2F08AA0B-A481-4A21-752D-8B5A0B7A9C8F}"/>
+              </a:ext>
+            </a:extLst>
+          </p:cNvPr>
+          <p:cNvPicPr>
+            <a:picLocks noGrp="1" noChangeAspect="1"/>
+          </p:cNvPicPr>
+          <p:nvPr>
+            <p:ph idx="1"/>
+          </p:nvPr>
+        </p:nvPicPr>
+        <p:blipFill>
+          <a:blip r:embed="rId3"/>
+          <a:stretch>
+            <a:fillRect/>
+          </a:stretch>
+        </p:blipFill>
+        <p:spPr>
+          <a:xfrm>
+            <a:off x="2438400" y="1690688"/>
+            <a:ext cx="7315200" cy="4301682"/>
+          </a:xfrm>
+          <a:prstGeom prst="rect">
+            <a:avLst/>
+          </a:prstGeom>
+        </p:spPr>
+      </p:pic>
+    </p:spTree>
+    <p:extLst>
+      <p:ext uri="{BB962C8B-B14F-4D97-AF65-F5344CB8AC3E}">
+        <p14:creationId xmlns:p14="http://schemas.microsoft.com/office/powerpoint/2010/main" val="1323473437"/>
+      </p:ext>
+    </p:extLst>
+  </p:cSld>
+  <p:clrMapOvr>
+    <a:masterClrMapping/>
+  </p:clrMapOvr>
+</p:sld>
+</file>
+
+<file path=ppt/slides/slide23.xml><?xml version="1.0" encoding="utf-8"?>
+<p:sld xmlns:a="http://schemas.openxmlformats.org/drawingml/2006/main" xmlns:r="http://schemas.openxmlformats.org/officeDocument/2006/relationships" xmlns:p="http://schemas.openxmlformats.org/presentationml/2006/main">
+  <p:cSld>
+    <p:spTree>
+      <p:nvGrpSpPr>
+        <p:cNvPr id="1" name=""/>
+        <p:cNvGrpSpPr/>
+        <p:nvPr/>
+      </p:nvGrpSpPr>
+      <p:grpSpPr>
+        <a:xfrm>
+          <a:off x="0" y="0"/>
+          <a:ext cx="0" cy="0"/>
+          <a:chOff x="0" y="0"/>
+          <a:chExt cx="0" cy="0"/>
+        </a:xfrm>
+      </p:grpSpPr>
+      <p:sp>
+        <p:nvSpPr>
+          <p:cNvPr id="4" name="Title 3">
+            <a:extLst>
+              <a:ext uri="{FF2B5EF4-FFF2-40B4-BE49-F238E27FC236}">
+                <a16:creationId xmlns:a16="http://schemas.microsoft.com/office/drawing/2014/main" id="{36563D18-B45A-5348-32B7-4E6B1DCE55E6}"/>
+              </a:ext>
+            </a:extLst>
+          </p:cNvPr>
+          <p:cNvSpPr>
+            <a:spLocks noGrp="1"/>
+          </p:cNvSpPr>
+          <p:nvPr>
+            <p:ph type="title"/>
+          </p:nvPr>
+        </p:nvSpPr>
+        <p:spPr/>
+        <p:txBody>
+          <a:bodyPr/>
+          <a:lstStyle/>
+          <a:p>
+            <a:r>
+              <a:rPr lang="en-US" dirty="0"/>
+              <a:t>6. Market Timing with Alberta / FOB Spread</a:t>
+            </a:r>
+          </a:p>
+        </p:txBody>
+      </p:sp>
+      <p:sp>
+        <p:nvSpPr>
+          <p:cNvPr id="5" name="Text Placeholder 4">
+            <a:extLst>
+              <a:ext uri="{FF2B5EF4-FFF2-40B4-BE49-F238E27FC236}">
+                <a16:creationId xmlns:a16="http://schemas.microsoft.com/office/drawing/2014/main" id="{5DA179D5-24BF-AE61-1760-B9C99A1DB01A}"/>
+              </a:ext>
+            </a:extLst>
+          </p:cNvPr>
+          <p:cNvSpPr>
+            <a:spLocks noGrp="1"/>
+          </p:cNvSpPr>
+          <p:nvPr>
+            <p:ph type="body" idx="1"/>
+          </p:nvPr>
+        </p:nvSpPr>
+        <p:spPr/>
+        <p:txBody>
+          <a:bodyPr/>
+          <a:lstStyle/>
+          <a:p>
+            <a:endParaRPr lang="en-US"/>
+          </a:p>
+        </p:txBody>
+      </p:sp>
+    </p:spTree>
+    <p:extLst>
+      <p:ext uri="{BB962C8B-B14F-4D97-AF65-F5344CB8AC3E}">
+        <p14:creationId xmlns:p14="http://schemas.microsoft.com/office/powerpoint/2010/main" val="3862971536"/>
+      </p:ext>
+    </p:extLst>
+  </p:cSld>
+  <p:clrMapOvr>
+    <a:masterClrMapping/>
+  </p:clrMapOvr>
+</p:sld>
+</file>
+
+<file path=ppt/slides/slide24.xml><?xml version="1.0" encoding="utf-8"?>
 <p:sld xmlns:a="http://schemas.openxmlformats.org/drawingml/2006/main" xmlns:r="http://schemas.openxmlformats.org/officeDocument/2006/relationships" xmlns:p="http://schemas.openxmlformats.org/presentationml/2006/main" show="0">
   <p:cSld>
     <p:spTree>
@@ -4794,7 +6455,7 @@
 </p:sld>
 </file>
 
-<file path=ppt/slides/slide17.xml><?xml version="1.0" encoding="utf-8"?>
+<file path=ppt/slides/slide25.xml><?xml version="1.0" encoding="utf-8"?>
 <p:sld xmlns:a="http://schemas.openxmlformats.org/drawingml/2006/main" xmlns:r="http://schemas.openxmlformats.org/officeDocument/2006/relationships" xmlns:p="http://schemas.openxmlformats.org/presentationml/2006/main">
   <p:cSld>
     <p:spTree>
@@ -4847,10 +6508,10 @@
       </p:sp>
       <p:pic>
         <p:nvPicPr>
-          <p:cNvPr id="9" name="Content Placeholder 8">
-            <a:extLst>
-              <a:ext uri="{FF2B5EF4-FFF2-40B4-BE49-F238E27FC236}">
-                <a16:creationId xmlns:a16="http://schemas.microsoft.com/office/drawing/2014/main" id="{DAFE664D-BA45-1329-5A5B-A5B41ADF04B9}"/>
+          <p:cNvPr id="6" name="Content Placeholder 5">
+            <a:extLst>
+              <a:ext uri="{FF2B5EF4-FFF2-40B4-BE49-F238E27FC236}">
+                <a16:creationId xmlns:a16="http://schemas.microsoft.com/office/drawing/2014/main" id="{8B04D95B-94B3-7EFE-20D6-C1D06A59691C}"/>
               </a:ext>
             </a:extLst>
           </p:cNvPr>
@@ -4869,8 +6530,8 @@
         </p:blipFill>
         <p:spPr>
           <a:xfrm>
-            <a:off x="2385953" y="1825625"/>
-            <a:ext cx="7420094" cy="4351338"/>
+            <a:off x="2391056" y="1825625"/>
+            <a:ext cx="7409887" cy="4351338"/>
           </a:xfrm>
           <a:prstGeom prst="rect">
             <a:avLst/>
@@ -4890,7 +6551,7 @@
 </p:sld>
 </file>
 
-<file path=ppt/slides/slide18.xml><?xml version="1.0" encoding="utf-8"?>
+<file path=ppt/slides/slide26.xml><?xml version="1.0" encoding="utf-8"?>
 <p:sld xmlns:a="http://schemas.openxmlformats.org/drawingml/2006/main" xmlns:r="http://schemas.openxmlformats.org/officeDocument/2006/relationships" xmlns:p="http://schemas.openxmlformats.org/presentationml/2006/main">
   <p:cSld>
     <p:spTree>
@@ -5029,7 +6690,7 @@
 </p:sld>
 </file>
 
-<file path=ppt/slides/slide19.xml><?xml version="1.0" encoding="utf-8"?>
+<file path=ppt/slides/slide27.xml><?xml version="1.0" encoding="utf-8"?>
 <p:sld xmlns:a="http://schemas.openxmlformats.org/drawingml/2006/main" xmlns:r="http://schemas.openxmlformats.org/officeDocument/2006/relationships" xmlns:p="http://schemas.openxmlformats.org/presentationml/2006/main">
   <p:cSld>
     <p:spTree>
@@ -5048,6 +6709,89 @@
       </p:grpSpPr>
       <p:sp>
         <p:nvSpPr>
+          <p:cNvPr id="5" name="Title 4">
+            <a:extLst>
+              <a:ext uri="{FF2B5EF4-FFF2-40B4-BE49-F238E27FC236}">
+                <a16:creationId xmlns:a16="http://schemas.microsoft.com/office/drawing/2014/main" id="{EFF5E8F3-093C-A82F-349A-0D8200E40A69}"/>
+              </a:ext>
+            </a:extLst>
+          </p:cNvPr>
+          <p:cNvSpPr>
+            <a:spLocks noGrp="1"/>
+          </p:cNvSpPr>
+          <p:nvPr>
+            <p:ph type="title"/>
+          </p:nvPr>
+        </p:nvSpPr>
+        <p:spPr/>
+        <p:txBody>
+          <a:bodyPr/>
+          <a:lstStyle/>
+          <a:p>
+            <a:r>
+              <a:rPr lang="en-US" dirty="0"/>
+              <a:t>7. Conclusion</a:t>
+            </a:r>
+          </a:p>
+        </p:txBody>
+      </p:sp>
+      <p:sp>
+        <p:nvSpPr>
+          <p:cNvPr id="6" name="Text Placeholder 5">
+            <a:extLst>
+              <a:ext uri="{FF2B5EF4-FFF2-40B4-BE49-F238E27FC236}">
+                <a16:creationId xmlns:a16="http://schemas.microsoft.com/office/drawing/2014/main" id="{123F174D-7DEA-E66C-40A8-8C4C9D0CCE05}"/>
+              </a:ext>
+            </a:extLst>
+          </p:cNvPr>
+          <p:cNvSpPr>
+            <a:spLocks noGrp="1"/>
+          </p:cNvSpPr>
+          <p:nvPr>
+            <p:ph type="body" idx="1"/>
+          </p:nvPr>
+        </p:nvSpPr>
+        <p:spPr/>
+        <p:txBody>
+          <a:bodyPr/>
+          <a:lstStyle/>
+          <a:p>
+            <a:endParaRPr lang="en-US"/>
+          </a:p>
+        </p:txBody>
+      </p:sp>
+    </p:spTree>
+    <p:extLst>
+      <p:ext uri="{BB962C8B-B14F-4D97-AF65-F5344CB8AC3E}">
+        <p14:creationId xmlns:p14="http://schemas.microsoft.com/office/powerpoint/2010/main" val="780710507"/>
+      </p:ext>
+    </p:extLst>
+  </p:cSld>
+  <p:clrMapOvr>
+    <a:masterClrMapping/>
+  </p:clrMapOvr>
+</p:sld>
+</file>
+
+<file path=ppt/slides/slide28.xml><?xml version="1.0" encoding="utf-8"?>
+<p:sld xmlns:a="http://schemas.openxmlformats.org/drawingml/2006/main" xmlns:r="http://schemas.openxmlformats.org/officeDocument/2006/relationships" xmlns:p="http://schemas.openxmlformats.org/presentationml/2006/main">
+  <p:cSld>
+    <p:spTree>
+      <p:nvGrpSpPr>
+        <p:cNvPr id="1" name=""/>
+        <p:cNvGrpSpPr/>
+        <p:nvPr/>
+      </p:nvGrpSpPr>
+      <p:grpSpPr>
+        <a:xfrm>
+          <a:off x="0" y="0"/>
+          <a:ext cx="0" cy="0"/>
+          <a:chOff x="0" y="0"/>
+          <a:chExt cx="0" cy="0"/>
+        </a:xfrm>
+      </p:grpSpPr>
+      <p:sp>
+        <p:nvSpPr>
           <p:cNvPr id="2" name="Title 1">
             <a:extLst>
               <a:ext uri="{FF2B5EF4-FFF2-40B4-BE49-F238E27FC236}">
@@ -5167,7 +6911,376 @@
 </p:sld>
 </file>
 
-<file path=ppt/slides/slide2.xml><?xml version="1.0" encoding="utf-8"?>
+<file path=ppt/slides/slide29.xml><?xml version="1.0" encoding="utf-8"?>
+<p:sld xmlns:a="http://schemas.openxmlformats.org/drawingml/2006/main" xmlns:r="http://schemas.openxmlformats.org/officeDocument/2006/relationships" xmlns:p="http://schemas.openxmlformats.org/presentationml/2006/main">
+  <p:cSld>
+    <p:spTree>
+      <p:nvGrpSpPr>
+        <p:cNvPr id="1" name=""/>
+        <p:cNvGrpSpPr/>
+        <p:nvPr/>
+      </p:nvGrpSpPr>
+      <p:grpSpPr>
+        <a:xfrm>
+          <a:off x="0" y="0"/>
+          <a:ext cx="0" cy="0"/>
+          <a:chOff x="0" y="0"/>
+          <a:chExt cx="0" cy="0"/>
+        </a:xfrm>
+      </p:grpSpPr>
+      <p:sp>
+        <p:nvSpPr>
+          <p:cNvPr id="2" name="Title 1">
+            <a:extLst>
+              <a:ext uri="{FF2B5EF4-FFF2-40B4-BE49-F238E27FC236}">
+                <a16:creationId xmlns:a16="http://schemas.microsoft.com/office/drawing/2014/main" id="{D2AD10FF-D898-99AA-C0C4-412754F8E392}"/>
+              </a:ext>
+            </a:extLst>
+          </p:cNvPr>
+          <p:cNvSpPr>
+            <a:spLocks noGrp="1"/>
+          </p:cNvSpPr>
+          <p:nvPr>
+            <p:ph type="title"/>
+          </p:nvPr>
+        </p:nvSpPr>
+        <p:spPr/>
+        <p:txBody>
+          <a:bodyPr/>
+          <a:lstStyle/>
+          <a:p>
+            <a:r>
+              <a:rPr lang="en-US" dirty="0"/>
+              <a:t>Risks</a:t>
+            </a:r>
+          </a:p>
+        </p:txBody>
+      </p:sp>
+      <p:sp>
+        <p:nvSpPr>
+          <p:cNvPr id="3" name="Content Placeholder 2">
+            <a:extLst>
+              <a:ext uri="{FF2B5EF4-FFF2-40B4-BE49-F238E27FC236}">
+                <a16:creationId xmlns:a16="http://schemas.microsoft.com/office/drawing/2014/main" id="{2BA2C75E-97D1-4403-7E8B-E8B90957FFFF}"/>
+              </a:ext>
+            </a:extLst>
+          </p:cNvPr>
+          <p:cNvSpPr>
+            <a:spLocks noGrp="1"/>
+          </p:cNvSpPr>
+          <p:nvPr>
+            <p:ph idx="1"/>
+          </p:nvPr>
+        </p:nvSpPr>
+        <p:spPr/>
+        <p:txBody>
+          <a:bodyPr/>
+          <a:lstStyle/>
+          <a:p>
+            <a:r>
+              <a:rPr lang="en-US" dirty="0"/>
+              <a:t>The end of the </a:t>
+            </a:r>
+            <a:r>
+              <a:rPr lang="en-US" b="1" dirty="0"/>
+              <a:t>Russia-Ukraine</a:t>
+            </a:r>
+            <a:r>
+              <a:rPr lang="en-US" dirty="0"/>
+              <a:t> conflict and the resumption of Russian exports to global markets, along with the termination of </a:t>
+            </a:r>
+            <a:r>
+              <a:rPr lang="en-US" b="1" dirty="0"/>
+              <a:t>China's zero-export policy </a:t>
+            </a:r>
+            <a:r>
+              <a:rPr lang="en-US" dirty="0"/>
+              <a:t>and the return of Chinese urea to international trade, can increase supply and cause further price declines in the short term.</a:t>
+            </a:r>
+          </a:p>
+        </p:txBody>
+      </p:sp>
+    </p:spTree>
+    <p:extLst>
+      <p:ext uri="{BB962C8B-B14F-4D97-AF65-F5344CB8AC3E}">
+        <p14:creationId xmlns:p14="http://schemas.microsoft.com/office/powerpoint/2010/main" val="3984814231"/>
+      </p:ext>
+    </p:extLst>
+  </p:cSld>
+  <p:clrMapOvr>
+    <a:masterClrMapping/>
+  </p:clrMapOvr>
+</p:sld>
+</file>
+
+<file path=ppt/slides/slide3.xml><?xml version="1.0" encoding="utf-8"?>
+<p:sld xmlns:a="http://schemas.openxmlformats.org/drawingml/2006/main" xmlns:r="http://schemas.openxmlformats.org/officeDocument/2006/relationships" xmlns:p="http://schemas.openxmlformats.org/presentationml/2006/main">
+  <p:cSld>
+    <p:spTree>
+      <p:nvGrpSpPr>
+        <p:cNvPr id="1" name=""/>
+        <p:cNvGrpSpPr/>
+        <p:nvPr/>
+      </p:nvGrpSpPr>
+      <p:grpSpPr>
+        <a:xfrm>
+          <a:off x="0" y="0"/>
+          <a:ext cx="0" cy="0"/>
+          <a:chOff x="0" y="0"/>
+          <a:chExt cx="0" cy="0"/>
+        </a:xfrm>
+      </p:grpSpPr>
+      <p:sp>
+        <p:nvSpPr>
+          <p:cNvPr id="4" name="Title 3">
+            <a:extLst>
+              <a:ext uri="{FF2B5EF4-FFF2-40B4-BE49-F238E27FC236}">
+                <a16:creationId xmlns:a16="http://schemas.microsoft.com/office/drawing/2014/main" id="{99EEFEB1-56BF-9725-3B41-1B3DB2D5FD81}"/>
+              </a:ext>
+            </a:extLst>
+          </p:cNvPr>
+          <p:cNvSpPr>
+            <a:spLocks noGrp="1"/>
+          </p:cNvSpPr>
+          <p:nvPr>
+            <p:ph type="title"/>
+          </p:nvPr>
+        </p:nvSpPr>
+        <p:spPr/>
+        <p:txBody>
+          <a:bodyPr/>
+          <a:lstStyle/>
+          <a:p>
+            <a:r>
+              <a:rPr lang="en-US" dirty="0"/>
+              <a:t>1. Conceptual Model</a:t>
+            </a:r>
+          </a:p>
+        </p:txBody>
+      </p:sp>
+      <p:sp>
+        <p:nvSpPr>
+          <p:cNvPr id="5" name="Text Placeholder 4">
+            <a:extLst>
+              <a:ext uri="{FF2B5EF4-FFF2-40B4-BE49-F238E27FC236}">
+                <a16:creationId xmlns:a16="http://schemas.microsoft.com/office/drawing/2014/main" id="{CACA28C3-30B3-5DD1-65B7-4C140453704A}"/>
+              </a:ext>
+            </a:extLst>
+          </p:cNvPr>
+          <p:cNvSpPr>
+            <a:spLocks noGrp="1"/>
+          </p:cNvSpPr>
+          <p:nvPr>
+            <p:ph type="body" idx="1"/>
+          </p:nvPr>
+        </p:nvSpPr>
+        <p:spPr/>
+        <p:txBody>
+          <a:bodyPr/>
+          <a:lstStyle/>
+          <a:p>
+            <a:endParaRPr lang="en-US"/>
+          </a:p>
+        </p:txBody>
+      </p:sp>
+    </p:spTree>
+    <p:extLst>
+      <p:ext uri="{BB962C8B-B14F-4D97-AF65-F5344CB8AC3E}">
+        <p14:creationId xmlns:p14="http://schemas.microsoft.com/office/powerpoint/2010/main" val="1216542402"/>
+      </p:ext>
+    </p:extLst>
+  </p:cSld>
+  <p:clrMapOvr>
+    <a:masterClrMapping/>
+  </p:clrMapOvr>
+</p:sld>
+</file>
+
+<file path=ppt/slides/slide30.xml><?xml version="1.0" encoding="utf-8"?>
+<p:sld xmlns:a="http://schemas.openxmlformats.org/drawingml/2006/main" xmlns:r="http://schemas.openxmlformats.org/officeDocument/2006/relationships" xmlns:p="http://schemas.openxmlformats.org/presentationml/2006/main">
+  <p:cSld>
+    <p:spTree>
+      <p:nvGrpSpPr>
+        <p:cNvPr id="1" name=""/>
+        <p:cNvGrpSpPr/>
+        <p:nvPr/>
+      </p:nvGrpSpPr>
+      <p:grpSpPr>
+        <a:xfrm>
+          <a:off x="0" y="0"/>
+          <a:ext cx="0" cy="0"/>
+          <a:chOff x="0" y="0"/>
+          <a:chExt cx="0" cy="0"/>
+        </a:xfrm>
+      </p:grpSpPr>
+      <p:sp>
+        <p:nvSpPr>
+          <p:cNvPr id="2" name="Title 1">
+            <a:extLst>
+              <a:ext uri="{FF2B5EF4-FFF2-40B4-BE49-F238E27FC236}">
+                <a16:creationId xmlns:a16="http://schemas.microsoft.com/office/drawing/2014/main" id="{FF3C50C3-9563-B44A-870F-6529095809B3}"/>
+              </a:ext>
+            </a:extLst>
+          </p:cNvPr>
+          <p:cNvSpPr>
+            <a:spLocks noGrp="1"/>
+          </p:cNvSpPr>
+          <p:nvPr>
+            <p:ph type="title"/>
+          </p:nvPr>
+        </p:nvSpPr>
+        <p:spPr/>
+        <p:txBody>
+          <a:bodyPr/>
+          <a:lstStyle/>
+          <a:p>
+            <a:r>
+              <a:rPr lang="en-US" dirty="0"/>
+              <a:t>Future Research</a:t>
+            </a:r>
+          </a:p>
+        </p:txBody>
+      </p:sp>
+      <p:sp>
+        <p:nvSpPr>
+          <p:cNvPr id="3" name="Content Placeholder 2">
+            <a:extLst>
+              <a:ext uri="{FF2B5EF4-FFF2-40B4-BE49-F238E27FC236}">
+                <a16:creationId xmlns:a16="http://schemas.microsoft.com/office/drawing/2014/main" id="{8ACA6A2F-43BA-42C8-C546-45B8E465896A}"/>
+              </a:ext>
+            </a:extLst>
+          </p:cNvPr>
+          <p:cNvSpPr>
+            <a:spLocks noGrp="1"/>
+          </p:cNvSpPr>
+          <p:nvPr>
+            <p:ph idx="1"/>
+          </p:nvPr>
+        </p:nvSpPr>
+        <p:spPr/>
+        <p:txBody>
+          <a:bodyPr>
+            <a:normAutofit fontScale="85000" lnSpcReduction="20000"/>
+          </a:bodyPr>
+          <a:lstStyle/>
+          <a:p>
+            <a:r>
+              <a:rPr lang="en-US" b="1" dirty="0"/>
+              <a:t>Interprovincial</a:t>
+            </a:r>
+            <a:r>
+              <a:rPr lang="en-US" dirty="0"/>
+              <a:t> trade dynamics and the price relationship between Eastern and Western Canada.</a:t>
+            </a:r>
+          </a:p>
+          <a:p>
+            <a:r>
+              <a:rPr lang="en-US" dirty="0"/>
+              <a:t>Analysis of </a:t>
+            </a:r>
+            <a:r>
+              <a:rPr lang="en-US" b="1" dirty="0"/>
+              <a:t>global supply and demand </a:t>
+            </a:r>
+            <a:r>
+              <a:rPr lang="en-US" dirty="0"/>
+              <a:t>of urea and crops.</a:t>
+            </a:r>
+          </a:p>
+          <a:p>
+            <a:r>
+              <a:rPr lang="en-US" dirty="0"/>
+              <a:t>Calculation of </a:t>
+            </a:r>
+            <a:r>
+              <a:rPr lang="en-US" b="1" dirty="0"/>
+              <a:t>CIF</a:t>
+            </a:r>
+            <a:r>
+              <a:rPr lang="en-US" dirty="0"/>
+              <a:t> prices to estimate wholesale price in Canada</a:t>
+            </a:r>
+          </a:p>
+          <a:p>
+            <a:r>
+              <a:rPr lang="en-US" dirty="0"/>
+              <a:t>Analysis of agriculture data from </a:t>
+            </a:r>
+            <a:r>
+              <a:rPr lang="en-US" b="1" dirty="0"/>
+              <a:t>Statistics Canada</a:t>
+            </a:r>
+            <a:r>
+              <a:rPr lang="en-US" dirty="0"/>
+              <a:t>, including:</a:t>
+            </a:r>
+            <a:endParaRPr lang="en-US" b="1" dirty="0"/>
+          </a:p>
+          <a:p>
+            <a:pPr lvl="1"/>
+            <a:r>
+              <a:rPr lang="en-US" dirty="0"/>
+              <a:t>Farm Product Price Index</a:t>
+            </a:r>
+          </a:p>
+          <a:p>
+            <a:pPr lvl="1"/>
+            <a:r>
+              <a:rPr lang="en-US" dirty="0"/>
+              <a:t>Farm Input Price Index</a:t>
+            </a:r>
+          </a:p>
+          <a:p>
+            <a:pPr lvl="1"/>
+            <a:r>
+              <a:rPr lang="en-US" dirty="0"/>
+              <a:t>Canadian Fertilizer Production</a:t>
+            </a:r>
+          </a:p>
+          <a:p>
+            <a:pPr lvl="1"/>
+            <a:r>
+              <a:rPr lang="en-US" dirty="0"/>
+              <a:t>Canadian Fertilizer Inventories</a:t>
+            </a:r>
+          </a:p>
+          <a:p>
+            <a:pPr lvl="1"/>
+            <a:r>
+              <a:rPr lang="en-US" dirty="0"/>
+              <a:t>Fertilizers Shipments</a:t>
+            </a:r>
+          </a:p>
+          <a:p>
+            <a:r>
+              <a:rPr lang="en-US" dirty="0"/>
+              <a:t>Analyzing the CFTC Commitment of Traders (</a:t>
+            </a:r>
+            <a:r>
+              <a:rPr lang="en-US" b="1" dirty="0"/>
+              <a:t>COT</a:t>
+            </a:r>
+            <a:r>
+              <a:rPr lang="en-US" dirty="0"/>
+              <a:t>) report for the futures market to gain insights into market sentiment and shifts in positions held by major hedge funds and producers.</a:t>
+            </a:r>
+          </a:p>
+        </p:txBody>
+      </p:sp>
+    </p:spTree>
+    <p:extLst>
+      <p:ext uri="{BB962C8B-B14F-4D97-AF65-F5344CB8AC3E}">
+        <p14:creationId xmlns:p14="http://schemas.microsoft.com/office/powerpoint/2010/main" val="2536895307"/>
+      </p:ext>
+    </p:extLst>
+  </p:cSld>
+  <p:clrMapOvr>
+    <a:masterClrMapping/>
+  </p:clrMapOvr>
+</p:sld>
+</file>
+
+<file path=ppt/slides/slide4.xml><?xml version="1.0" encoding="utf-8"?>
 <p:sld xmlns:a="http://schemas.openxmlformats.org/drawingml/2006/main" xmlns:r="http://schemas.openxmlformats.org/officeDocument/2006/relationships" xmlns:p="http://schemas.openxmlformats.org/presentationml/2006/main">
   <p:cSld>
     <p:spTree>
@@ -5274,7 +7387,7 @@
 </p:sld>
 </file>
 
-<file path=ppt/slides/slide20.xml><?xml version="1.0" encoding="utf-8"?>
+<file path=ppt/slides/slide5.xml><?xml version="1.0" encoding="utf-8"?>
 <p:sld xmlns:a="http://schemas.openxmlformats.org/drawingml/2006/main" xmlns:r="http://schemas.openxmlformats.org/officeDocument/2006/relationships" xmlns:p="http://schemas.openxmlformats.org/presentationml/2006/main">
   <p:cSld>
     <p:spTree>
@@ -5296,258 +7409,6 @@
           <p:cNvPr id="2" name="Title 1">
             <a:extLst>
               <a:ext uri="{FF2B5EF4-FFF2-40B4-BE49-F238E27FC236}">
-                <a16:creationId xmlns:a16="http://schemas.microsoft.com/office/drawing/2014/main" id="{D2AD10FF-D898-99AA-C0C4-412754F8E392}"/>
-              </a:ext>
-            </a:extLst>
-          </p:cNvPr>
-          <p:cNvSpPr>
-            <a:spLocks noGrp="1"/>
-          </p:cNvSpPr>
-          <p:nvPr>
-            <p:ph type="title"/>
-          </p:nvPr>
-        </p:nvSpPr>
-        <p:spPr/>
-        <p:txBody>
-          <a:bodyPr/>
-          <a:lstStyle/>
-          <a:p>
-            <a:r>
-              <a:rPr lang="en-US" dirty="0"/>
-              <a:t>Risks</a:t>
-            </a:r>
-          </a:p>
-        </p:txBody>
-      </p:sp>
-      <p:sp>
-        <p:nvSpPr>
-          <p:cNvPr id="3" name="Content Placeholder 2">
-            <a:extLst>
-              <a:ext uri="{FF2B5EF4-FFF2-40B4-BE49-F238E27FC236}">
-                <a16:creationId xmlns:a16="http://schemas.microsoft.com/office/drawing/2014/main" id="{2BA2C75E-97D1-4403-7E8B-E8B90957FFFF}"/>
-              </a:ext>
-            </a:extLst>
-          </p:cNvPr>
-          <p:cNvSpPr>
-            <a:spLocks noGrp="1"/>
-          </p:cNvSpPr>
-          <p:nvPr>
-            <p:ph idx="1"/>
-          </p:nvPr>
-        </p:nvSpPr>
-        <p:spPr/>
-        <p:txBody>
-          <a:bodyPr/>
-          <a:lstStyle/>
-          <a:p>
-            <a:r>
-              <a:rPr lang="en-US" dirty="0"/>
-              <a:t>The end of the </a:t>
-            </a:r>
-            <a:r>
-              <a:rPr lang="en-US" b="1" dirty="0"/>
-              <a:t>Russia-Ukraine</a:t>
-            </a:r>
-            <a:r>
-              <a:rPr lang="en-US" dirty="0"/>
-              <a:t> conflict and the resumption of Russian exports to global markets, along with the termination of </a:t>
-            </a:r>
-            <a:r>
-              <a:rPr lang="en-US" b="1" dirty="0"/>
-              <a:t>China's zero-export policy </a:t>
-            </a:r>
-            <a:r>
-              <a:rPr lang="en-US" dirty="0"/>
-              <a:t>and the return of Chinese urea to international trade, can increase supply and cause further price declines in the short term.</a:t>
-            </a:r>
-          </a:p>
-        </p:txBody>
-      </p:sp>
-    </p:spTree>
-    <p:extLst>
-      <p:ext uri="{BB962C8B-B14F-4D97-AF65-F5344CB8AC3E}">
-        <p14:creationId xmlns:p14="http://schemas.microsoft.com/office/powerpoint/2010/main" val="3984814231"/>
-      </p:ext>
-    </p:extLst>
-  </p:cSld>
-  <p:clrMapOvr>
-    <a:masterClrMapping/>
-  </p:clrMapOvr>
-</p:sld>
-</file>
-
-<file path=ppt/slides/slide21.xml><?xml version="1.0" encoding="utf-8"?>
-<p:sld xmlns:a="http://schemas.openxmlformats.org/drawingml/2006/main" xmlns:r="http://schemas.openxmlformats.org/officeDocument/2006/relationships" xmlns:p="http://schemas.openxmlformats.org/presentationml/2006/main">
-  <p:cSld>
-    <p:spTree>
-      <p:nvGrpSpPr>
-        <p:cNvPr id="1" name=""/>
-        <p:cNvGrpSpPr/>
-        <p:nvPr/>
-      </p:nvGrpSpPr>
-      <p:grpSpPr>
-        <a:xfrm>
-          <a:off x="0" y="0"/>
-          <a:ext cx="0" cy="0"/>
-          <a:chOff x="0" y="0"/>
-          <a:chExt cx="0" cy="0"/>
-        </a:xfrm>
-      </p:grpSpPr>
-      <p:sp>
-        <p:nvSpPr>
-          <p:cNvPr id="2" name="Title 1">
-            <a:extLst>
-              <a:ext uri="{FF2B5EF4-FFF2-40B4-BE49-F238E27FC236}">
-                <a16:creationId xmlns:a16="http://schemas.microsoft.com/office/drawing/2014/main" id="{FF3C50C3-9563-B44A-870F-6529095809B3}"/>
-              </a:ext>
-            </a:extLst>
-          </p:cNvPr>
-          <p:cNvSpPr>
-            <a:spLocks noGrp="1"/>
-          </p:cNvSpPr>
-          <p:nvPr>
-            <p:ph type="title"/>
-          </p:nvPr>
-        </p:nvSpPr>
-        <p:spPr/>
-        <p:txBody>
-          <a:bodyPr/>
-          <a:lstStyle/>
-          <a:p>
-            <a:r>
-              <a:rPr lang="en-US" dirty="0"/>
-              <a:t>Future Research</a:t>
-            </a:r>
-          </a:p>
-        </p:txBody>
-      </p:sp>
-      <p:sp>
-        <p:nvSpPr>
-          <p:cNvPr id="3" name="Content Placeholder 2">
-            <a:extLst>
-              <a:ext uri="{FF2B5EF4-FFF2-40B4-BE49-F238E27FC236}">
-                <a16:creationId xmlns:a16="http://schemas.microsoft.com/office/drawing/2014/main" id="{8ACA6A2F-43BA-42C8-C546-45B8E465896A}"/>
-              </a:ext>
-            </a:extLst>
-          </p:cNvPr>
-          <p:cNvSpPr>
-            <a:spLocks noGrp="1"/>
-          </p:cNvSpPr>
-          <p:nvPr>
-            <p:ph idx="1"/>
-          </p:nvPr>
-        </p:nvSpPr>
-        <p:spPr/>
-        <p:txBody>
-          <a:bodyPr>
-            <a:normAutofit lnSpcReduction="10000"/>
-          </a:bodyPr>
-          <a:lstStyle/>
-          <a:p>
-            <a:r>
-              <a:rPr lang="en-US" dirty="0"/>
-              <a:t>Interprovincial trade dynamics and the price relationship between Eastern and Western Canada.</a:t>
-            </a:r>
-          </a:p>
-          <a:p>
-            <a:r>
-              <a:rPr lang="en-US" dirty="0"/>
-              <a:t>Analysis of global supply and demand of urea and crops.</a:t>
-            </a:r>
-          </a:p>
-          <a:p>
-            <a:r>
-              <a:rPr lang="en-US" dirty="0"/>
-              <a:t>Calculation of CIF prices to estimate wholesale price in Canada</a:t>
-            </a:r>
-          </a:p>
-          <a:p>
-            <a:r>
-              <a:rPr lang="en-US" dirty="0"/>
-              <a:t>Analysis of agriculture data from </a:t>
-            </a:r>
-            <a:r>
-              <a:rPr lang="en-US" b="1" dirty="0"/>
-              <a:t>Statistics Canada</a:t>
-            </a:r>
-            <a:r>
-              <a:rPr lang="en-US" dirty="0"/>
-              <a:t>, including:</a:t>
-            </a:r>
-            <a:endParaRPr lang="en-US" b="1" dirty="0"/>
-          </a:p>
-          <a:p>
-            <a:pPr lvl="1"/>
-            <a:r>
-              <a:rPr lang="en-US" dirty="0"/>
-              <a:t>Farm Product Price Index</a:t>
-            </a:r>
-          </a:p>
-          <a:p>
-            <a:pPr lvl="1"/>
-            <a:r>
-              <a:rPr lang="en-US" dirty="0"/>
-              <a:t>Farm Input Price Index</a:t>
-            </a:r>
-          </a:p>
-          <a:p>
-            <a:pPr lvl="1"/>
-            <a:r>
-              <a:rPr lang="en-US" dirty="0"/>
-              <a:t>Canadian Fertilizer Production</a:t>
-            </a:r>
-          </a:p>
-          <a:p>
-            <a:pPr lvl="1"/>
-            <a:r>
-              <a:rPr lang="en-US" dirty="0"/>
-              <a:t>Canadian Fertilizer Inventories</a:t>
-            </a:r>
-          </a:p>
-          <a:p>
-            <a:pPr lvl="1"/>
-            <a:r>
-              <a:rPr lang="en-US" dirty="0"/>
-              <a:t>Fertilizers Shipments</a:t>
-            </a:r>
-          </a:p>
-        </p:txBody>
-      </p:sp>
-    </p:spTree>
-    <p:extLst>
-      <p:ext uri="{BB962C8B-B14F-4D97-AF65-F5344CB8AC3E}">
-        <p14:creationId xmlns:p14="http://schemas.microsoft.com/office/powerpoint/2010/main" val="2536895307"/>
-      </p:ext>
-    </p:extLst>
-  </p:cSld>
-  <p:clrMapOvr>
-    <a:masterClrMapping/>
-  </p:clrMapOvr>
-</p:sld>
-</file>
-
-<file path=ppt/slides/slide3.xml><?xml version="1.0" encoding="utf-8"?>
-<p:sld xmlns:a="http://schemas.openxmlformats.org/drawingml/2006/main" xmlns:r="http://schemas.openxmlformats.org/officeDocument/2006/relationships" xmlns:p="http://schemas.openxmlformats.org/presentationml/2006/main">
-  <p:cSld>
-    <p:spTree>
-      <p:nvGrpSpPr>
-        <p:cNvPr id="1" name=""/>
-        <p:cNvGrpSpPr/>
-        <p:nvPr/>
-      </p:nvGrpSpPr>
-      <p:grpSpPr>
-        <a:xfrm>
-          <a:off x="0" y="0"/>
-          <a:ext cx="0" cy="0"/>
-          <a:chOff x="0" y="0"/>
-          <a:chExt cx="0" cy="0"/>
-        </a:xfrm>
-      </p:grpSpPr>
-      <p:sp>
-        <p:nvSpPr>
-          <p:cNvPr id="2" name="Title 1">
-            <a:extLst>
-              <a:ext uri="{FF2B5EF4-FFF2-40B4-BE49-F238E27FC236}">
                 <a16:creationId xmlns:a16="http://schemas.microsoft.com/office/drawing/2014/main" id="{BFD24323-8332-2E2C-EAE3-BCF0EE7C09B3}"/>
               </a:ext>
             </a:extLst>
@@ -5567,12 +7428,8 @@
           <a:lstStyle/>
           <a:p>
             <a:r>
-              <a:rPr lang="en-US" b="1" dirty="0"/>
-              <a:t>Natural Gas </a:t>
-            </a:r>
-            <a:r>
               <a:rPr lang="en-US" dirty="0"/>
-              <a:t>accounts for 70-90% of urea variable production costs</a:t>
+              <a:t>Natural Gas accounts for 70-90% of urea variable production costs</a:t>
             </a:r>
           </a:p>
         </p:txBody>
@@ -5622,7 +7479,7 @@
 </p:sld>
 </file>
 
-<file path=ppt/slides/slide4.xml><?xml version="1.0" encoding="utf-8"?>
+<file path=ppt/slides/slide6.xml><?xml version="1.0" encoding="utf-8"?>
 <p:sld xmlns:a="http://schemas.openxmlformats.org/drawingml/2006/main" xmlns:r="http://schemas.openxmlformats.org/officeDocument/2006/relationships" xmlns:p="http://schemas.openxmlformats.org/presentationml/2006/main">
   <p:cSld>
     <p:spTree>
@@ -5661,12 +7518,8 @@
           <a:lstStyle/>
           <a:p>
             <a:r>
-              <a:rPr lang="en-US" b="1" dirty="0"/>
-              <a:t>Corn</a:t>
-            </a:r>
-            <a:r>
               <a:rPr lang="en-US" dirty="0"/>
-              <a:t> price is a proxy for agriculture / urea demand </a:t>
+              <a:t>Corn price is a proxy for agriculture / urea demand </a:t>
             </a:r>
             <a:endParaRPr lang="en-US" b="1" dirty="0"/>
           </a:p>
@@ -5717,7 +7570,7 @@
 </p:sld>
 </file>
 
-<file path=ppt/slides/slide5.xml><?xml version="1.0" encoding="utf-8"?>
+<file path=ppt/slides/slide7.xml><?xml version="1.0" encoding="utf-8"?>
 <p:sld xmlns:a="http://schemas.openxmlformats.org/drawingml/2006/main" xmlns:r="http://schemas.openxmlformats.org/officeDocument/2006/relationships" xmlns:p="http://schemas.openxmlformats.org/presentationml/2006/main">
   <p:cSld>
     <p:spTree>
@@ -5756,12 +7609,8 @@
           <a:lstStyle/>
           <a:p>
             <a:r>
-              <a:rPr lang="en-US" b="1" dirty="0"/>
-              <a:t>Diesel</a:t>
-            </a:r>
-            <a:r>
               <a:rPr lang="en-US" dirty="0"/>
-              <a:t>, transportation costs by trucks, rail, or ship</a:t>
+              <a:t>Diesel – transportation costs by trucks, rail, or ship</a:t>
             </a:r>
           </a:p>
         </p:txBody>
@@ -5811,7 +7660,7 @@
 </p:sld>
 </file>
 
-<file path=ppt/slides/slide6.xml><?xml version="1.0" encoding="utf-8"?>
+<file path=ppt/slides/slide8.xml><?xml version="1.0" encoding="utf-8"?>
 <p:sld xmlns:a="http://schemas.openxmlformats.org/drawingml/2006/main" xmlns:r="http://schemas.openxmlformats.org/officeDocument/2006/relationships" xmlns:p="http://schemas.openxmlformats.org/presentationml/2006/main">
   <p:cSld>
     <p:spTree>
@@ -5850,12 +7699,8 @@
           <a:lstStyle/>
           <a:p>
             <a:r>
-              <a:rPr lang="en-US" b="1" dirty="0"/>
-              <a:t>Barge Rate </a:t>
-            </a:r>
-            <a:r>
               <a:rPr lang="en-US" dirty="0"/>
-              <a:t>(Mississippi), transportation cost from US</a:t>
+              <a:t>Barge Rate (Mississippi), transportation cost from US</a:t>
             </a:r>
           </a:p>
         </p:txBody>
@@ -5905,7 +7750,7 @@
 </p:sld>
 </file>
 
-<file path=ppt/slides/slide7.xml><?xml version="1.0" encoding="utf-8"?>
+<file path=ppt/slides/slide9.xml><?xml version="1.0" encoding="utf-8"?>
 <p:sld xmlns:a="http://schemas.openxmlformats.org/drawingml/2006/main" xmlns:r="http://schemas.openxmlformats.org/officeDocument/2006/relationships" xmlns:p="http://schemas.openxmlformats.org/presentationml/2006/main">
   <p:cSld>
     <p:spTree>
@@ -6051,186 +7896,6 @@
     <p:extLst>
       <p:ext uri="{BB962C8B-B14F-4D97-AF65-F5344CB8AC3E}">
         <p14:creationId xmlns:p14="http://schemas.microsoft.com/office/powerpoint/2010/main" val="894030161"/>
-      </p:ext>
-    </p:extLst>
-  </p:cSld>
-  <p:clrMapOvr>
-    <a:masterClrMapping/>
-  </p:clrMapOvr>
-</p:sld>
-</file>
-
-<file path=ppt/slides/slide8.xml><?xml version="1.0" encoding="utf-8"?>
-<p:sld xmlns:a="http://schemas.openxmlformats.org/drawingml/2006/main" xmlns:r="http://schemas.openxmlformats.org/officeDocument/2006/relationships" xmlns:p="http://schemas.openxmlformats.org/presentationml/2006/main">
-  <p:cSld>
-    <p:spTree>
-      <p:nvGrpSpPr>
-        <p:cNvPr id="1" name=""/>
-        <p:cNvGrpSpPr/>
-        <p:nvPr/>
-      </p:nvGrpSpPr>
-      <p:grpSpPr>
-        <a:xfrm>
-          <a:off x="0" y="0"/>
-          <a:ext cx="0" cy="0"/>
-          <a:chOff x="0" y="0"/>
-          <a:chExt cx="0" cy="0"/>
-        </a:xfrm>
-      </p:grpSpPr>
-      <p:sp>
-        <p:nvSpPr>
-          <p:cNvPr id="2" name="Title 1">
-            <a:extLst>
-              <a:ext uri="{FF2B5EF4-FFF2-40B4-BE49-F238E27FC236}">
-                <a16:creationId xmlns:a16="http://schemas.microsoft.com/office/drawing/2014/main" id="{B2E830F0-B6D0-2FF7-78B7-50BF75D1D3ED}"/>
-              </a:ext>
-            </a:extLst>
-          </p:cNvPr>
-          <p:cNvSpPr>
-            <a:spLocks noGrp="1"/>
-          </p:cNvSpPr>
-          <p:nvPr>
-            <p:ph type="title"/>
-          </p:nvPr>
-        </p:nvSpPr>
-        <p:spPr/>
-        <p:txBody>
-          <a:bodyPr/>
-          <a:lstStyle/>
-          <a:p>
-            <a:r>
-              <a:rPr lang="en-US" dirty="0"/>
-              <a:t>Corn is trading at 2010 levels and is undervalued</a:t>
-            </a:r>
-          </a:p>
-        </p:txBody>
-      </p:sp>
-      <p:pic>
-        <p:nvPicPr>
-          <p:cNvPr id="5" name="Content Placeholder 4">
-            <a:extLst>
-              <a:ext uri="{FF2B5EF4-FFF2-40B4-BE49-F238E27FC236}">
-                <a16:creationId xmlns:a16="http://schemas.microsoft.com/office/drawing/2014/main" id="{AEA6959C-C966-946D-31B9-5DC6E74DB857}"/>
-              </a:ext>
-            </a:extLst>
-          </p:cNvPr>
-          <p:cNvPicPr>
-            <a:picLocks noGrp="1" noChangeAspect="1"/>
-          </p:cNvPicPr>
-          <p:nvPr>
-            <p:ph idx="1"/>
-          </p:nvPr>
-        </p:nvPicPr>
-        <p:blipFill>
-          <a:blip r:embed="rId2"/>
-          <a:stretch>
-            <a:fillRect/>
-          </a:stretch>
-        </p:blipFill>
-        <p:spPr>
-          <a:xfrm>
-            <a:off x="2384333" y="1825625"/>
-            <a:ext cx="7423334" cy="4351338"/>
-          </a:xfrm>
-          <a:prstGeom prst="rect">
-            <a:avLst/>
-          </a:prstGeom>
-        </p:spPr>
-      </p:pic>
-    </p:spTree>
-    <p:extLst>
-      <p:ext uri="{BB962C8B-B14F-4D97-AF65-F5344CB8AC3E}">
-        <p14:creationId xmlns:p14="http://schemas.microsoft.com/office/powerpoint/2010/main" val="2820620688"/>
-      </p:ext>
-    </p:extLst>
-  </p:cSld>
-  <p:clrMapOvr>
-    <a:masterClrMapping/>
-  </p:clrMapOvr>
-</p:sld>
-</file>
-
-<file path=ppt/slides/slide9.xml><?xml version="1.0" encoding="utf-8"?>
-<p:sld xmlns:a="http://schemas.openxmlformats.org/drawingml/2006/main" xmlns:r="http://schemas.openxmlformats.org/officeDocument/2006/relationships" xmlns:p="http://schemas.openxmlformats.org/presentationml/2006/main">
-  <p:cSld>
-    <p:spTree>
-      <p:nvGrpSpPr>
-        <p:cNvPr id="1" name=""/>
-        <p:cNvGrpSpPr/>
-        <p:nvPr/>
-      </p:nvGrpSpPr>
-      <p:grpSpPr>
-        <a:xfrm>
-          <a:off x="0" y="0"/>
-          <a:ext cx="0" cy="0"/>
-          <a:chOff x="0" y="0"/>
-          <a:chExt cx="0" cy="0"/>
-        </a:xfrm>
-      </p:grpSpPr>
-      <p:sp>
-        <p:nvSpPr>
-          <p:cNvPr id="2" name="Title 1">
-            <a:extLst>
-              <a:ext uri="{FF2B5EF4-FFF2-40B4-BE49-F238E27FC236}">
-                <a16:creationId xmlns:a16="http://schemas.microsoft.com/office/drawing/2014/main" id="{AF98EA6E-BA16-09A3-7211-A03632216E8C}"/>
-              </a:ext>
-            </a:extLst>
-          </p:cNvPr>
-          <p:cNvSpPr>
-            <a:spLocks noGrp="1"/>
-          </p:cNvSpPr>
-          <p:nvPr>
-            <p:ph type="title"/>
-          </p:nvPr>
-        </p:nvSpPr>
-        <p:spPr/>
-        <p:txBody>
-          <a:bodyPr/>
-          <a:lstStyle/>
-          <a:p>
-            <a:r>
-              <a:rPr lang="en-US" dirty="0"/>
-              <a:t>Corn price is below CPI Food Index (Annual Growth Rate = 3%)</a:t>
-            </a:r>
-          </a:p>
-        </p:txBody>
-      </p:sp>
-      <p:pic>
-        <p:nvPicPr>
-          <p:cNvPr id="5" name="Content Placeholder 4">
-            <a:extLst>
-              <a:ext uri="{FF2B5EF4-FFF2-40B4-BE49-F238E27FC236}">
-                <a16:creationId xmlns:a16="http://schemas.microsoft.com/office/drawing/2014/main" id="{1D91138E-829A-BF2B-E202-36CFB18A9973}"/>
-              </a:ext>
-            </a:extLst>
-          </p:cNvPr>
-          <p:cNvPicPr>
-            <a:picLocks noGrp="1" noChangeAspect="1"/>
-          </p:cNvPicPr>
-          <p:nvPr>
-            <p:ph idx="1"/>
-          </p:nvPr>
-        </p:nvPicPr>
-        <p:blipFill>
-          <a:blip r:embed="rId2"/>
-          <a:stretch>
-            <a:fillRect/>
-          </a:stretch>
-        </p:blipFill>
-        <p:spPr>
-          <a:xfrm>
-            <a:off x="2398939" y="1825625"/>
-            <a:ext cx="7394121" cy="4351338"/>
-          </a:xfrm>
-          <a:prstGeom prst="rect">
-            <a:avLst/>
-          </a:prstGeom>
-        </p:spPr>
-      </p:pic>
-    </p:spTree>
-    <p:extLst>
-      <p:ext uri="{BB962C8B-B14F-4D97-AF65-F5344CB8AC3E}">
-        <p14:creationId xmlns:p14="http://schemas.microsoft.com/office/powerpoint/2010/main" val="221586455"/>
       </p:ext>
     </p:extLst>
   </p:cSld>

</xml_diff>